<commit_message>
added sem 5 files
</commit_message>
<xml_diff>
--- a/new ppt.pptx
+++ b/new ppt.pptx
@@ -9,7 +9,7 @@
     <p:sldMasterId id="2147483913" r:id="rId5"/>
   </p:sldMasterIdLst>
   <p:notesMasterIdLst>
-    <p:notesMasterId r:id="rId27"/>
+    <p:notesMasterId r:id="rId24"/>
   </p:notesMasterIdLst>
   <p:sldIdLst>
     <p:sldId id="666" r:id="rId6"/>
@@ -17,22 +17,19 @@
     <p:sldId id="665" r:id="rId8"/>
     <p:sldId id="687" r:id="rId9"/>
     <p:sldId id="688" r:id="rId10"/>
-    <p:sldId id="683" r:id="rId11"/>
-    <p:sldId id="689" r:id="rId12"/>
-    <p:sldId id="690" r:id="rId13"/>
-    <p:sldId id="684" r:id="rId14"/>
-    <p:sldId id="691" r:id="rId15"/>
-    <p:sldId id="692" r:id="rId16"/>
-    <p:sldId id="685" r:id="rId17"/>
-    <p:sldId id="693" r:id="rId18"/>
-    <p:sldId id="686" r:id="rId19"/>
-    <p:sldId id="694" r:id="rId20"/>
-    <p:sldId id="695" r:id="rId21"/>
-    <p:sldId id="696" r:id="rId22"/>
-    <p:sldId id="670" r:id="rId23"/>
-    <p:sldId id="697" r:id="rId24"/>
-    <p:sldId id="667" r:id="rId25"/>
-    <p:sldId id="677" r:id="rId26"/>
+    <p:sldId id="689" r:id="rId11"/>
+    <p:sldId id="690" r:id="rId12"/>
+    <p:sldId id="691" r:id="rId13"/>
+    <p:sldId id="692" r:id="rId14"/>
+    <p:sldId id="693" r:id="rId15"/>
+    <p:sldId id="686" r:id="rId16"/>
+    <p:sldId id="694" r:id="rId17"/>
+    <p:sldId id="695" r:id="rId18"/>
+    <p:sldId id="696" r:id="rId19"/>
+    <p:sldId id="670" r:id="rId20"/>
+    <p:sldId id="697" r:id="rId21"/>
+    <p:sldId id="667" r:id="rId22"/>
+    <p:sldId id="677" r:id="rId23"/>
   </p:sldIdLst>
   <p:sldSz cx="9144000" cy="6858000" type="screen4x3"/>
   <p:notesSz cx="6858000" cy="9144000"/>
@@ -9237,7 +9234,7 @@
               <a:pPr>
                 <a:defRPr/>
               </a:pPr>
-              <a:t>4/6/2022</a:t>
+              <a:t>5/1/2022</a:t>
             </a:fld>
             <a:endParaRPr lang="en-US"/>
           </a:p>
@@ -11667,7 +11664,7 @@
               <a:pPr>
                 <a:defRPr/>
               </a:pPr>
-              <a:t>4/6/2022</a:t>
+              <a:t>5/1/2022</a:t>
             </a:fld>
             <a:endParaRPr lang="en-US"/>
           </a:p>
@@ -12105,7 +12102,7 @@
               <a:pPr>
                 <a:defRPr/>
               </a:pPr>
-              <a:t>4/6/2022</a:t>
+              <a:t>5/1/2022</a:t>
             </a:fld>
             <a:endParaRPr lang="en-US"/>
           </a:p>
@@ -12395,7 +12392,7 @@
               <a:pPr>
                 <a:defRPr/>
               </a:pPr>
-              <a:t>4/6/2022</a:t>
+              <a:t>5/1/2022</a:t>
             </a:fld>
             <a:endParaRPr lang="en-US"/>
           </a:p>
@@ -12669,7 +12666,7 @@
               <a:pPr>
                 <a:defRPr/>
               </a:pPr>
-              <a:t>4/6/2022</a:t>
+              <a:t>5/1/2022</a:t>
             </a:fld>
             <a:endParaRPr lang="en-US"/>
           </a:p>
@@ -13078,7 +13075,7 @@
               <a:pPr>
                 <a:defRPr/>
               </a:pPr>
-              <a:t>4/6/2022</a:t>
+              <a:t>5/1/2022</a:t>
             </a:fld>
             <a:endParaRPr lang="en-US"/>
           </a:p>
@@ -13240,7 +13237,7 @@
               <a:pPr>
                 <a:defRPr/>
               </a:pPr>
-              <a:t>4/6/2022</a:t>
+              <a:t>5/1/2022</a:t>
             </a:fld>
             <a:endParaRPr lang="en-US"/>
           </a:p>
@@ -13380,7 +13377,7 @@
               <a:pPr>
                 <a:defRPr/>
               </a:pPr>
-              <a:t>4/6/2022</a:t>
+              <a:t>5/1/2022</a:t>
             </a:fld>
             <a:endParaRPr lang="en-US"/>
           </a:p>
@@ -13700,7 +13697,7 @@
               <a:pPr>
                 <a:defRPr/>
               </a:pPr>
-              <a:t>4/6/2022</a:t>
+              <a:t>5/1/2022</a:t>
             </a:fld>
             <a:endParaRPr lang="en-US"/>
           </a:p>
@@ -14000,7 +13997,7 @@
               <a:pPr>
                 <a:defRPr/>
               </a:pPr>
-              <a:t>4/6/2022</a:t>
+              <a:t>5/1/2022</a:t>
             </a:fld>
             <a:endParaRPr lang="en-US"/>
           </a:p>
@@ -14213,7 +14210,7 @@
               <a:pPr>
                 <a:defRPr/>
               </a:pPr>
-              <a:t>4/6/2022</a:t>
+              <a:t>5/1/2022</a:t>
             </a:fld>
             <a:endParaRPr lang="en-US"/>
           </a:p>
@@ -14436,7 +14433,7 @@
               <a:pPr>
                 <a:defRPr/>
               </a:pPr>
-              <a:t>4/6/2022</a:t>
+              <a:t>5/1/2022</a:t>
             </a:fld>
             <a:endParaRPr lang="en-US"/>
           </a:p>
@@ -14993,7 +14990,7 @@
               <a:pPr>
                 <a:defRPr/>
               </a:pPr>
-              <a:t>4/6/2022</a:t>
+              <a:t>5/1/2022</a:t>
             </a:fld>
             <a:endParaRPr lang="en-US"/>
           </a:p>
@@ -15206,7 +15203,7 @@
               <a:pPr>
                 <a:defRPr/>
               </a:pPr>
-              <a:t>4/6/2022</a:t>
+              <a:t>5/1/2022</a:t>
             </a:fld>
             <a:endParaRPr lang="en-US"/>
           </a:p>
@@ -15496,7 +15493,7 @@
               <a:pPr>
                 <a:defRPr/>
               </a:pPr>
-              <a:t>4/6/2022</a:t>
+              <a:t>5/1/2022</a:t>
             </a:fld>
             <a:endParaRPr lang="en-US"/>
           </a:p>
@@ -15770,7 +15767,7 @@
               <a:pPr>
                 <a:defRPr/>
               </a:pPr>
-              <a:t>4/6/2022</a:t>
+              <a:t>5/1/2022</a:t>
             </a:fld>
             <a:endParaRPr lang="en-US"/>
           </a:p>
@@ -16179,7 +16176,7 @@
               <a:pPr>
                 <a:defRPr/>
               </a:pPr>
-              <a:t>4/6/2022</a:t>
+              <a:t>5/1/2022</a:t>
             </a:fld>
             <a:endParaRPr lang="en-US"/>
           </a:p>
@@ -16341,7 +16338,7 @@
               <a:pPr>
                 <a:defRPr/>
               </a:pPr>
-              <a:t>4/6/2022</a:t>
+              <a:t>5/1/2022</a:t>
             </a:fld>
             <a:endParaRPr lang="en-US"/>
           </a:p>
@@ -16481,7 +16478,7 @@
               <a:pPr>
                 <a:defRPr/>
               </a:pPr>
-              <a:t>4/6/2022</a:t>
+              <a:t>5/1/2022</a:t>
             </a:fld>
             <a:endParaRPr lang="en-US"/>
           </a:p>
@@ -16801,7 +16798,7 @@
               <a:pPr>
                 <a:defRPr/>
               </a:pPr>
-              <a:t>4/6/2022</a:t>
+              <a:t>5/1/2022</a:t>
             </a:fld>
             <a:endParaRPr lang="en-US"/>
           </a:p>
@@ -17101,7 +17098,7 @@
               <a:pPr>
                 <a:defRPr/>
               </a:pPr>
-              <a:t>4/6/2022</a:t>
+              <a:t>5/1/2022</a:t>
             </a:fld>
             <a:endParaRPr lang="en-US"/>
           </a:p>
@@ -17314,7 +17311,7 @@
               <a:pPr>
                 <a:defRPr/>
               </a:pPr>
-              <a:t>4/6/2022</a:t>
+              <a:t>5/1/2022</a:t>
             </a:fld>
             <a:endParaRPr lang="en-US"/>
           </a:p>
@@ -17909,7 +17906,7 @@
               <a:pPr>
                 <a:defRPr/>
               </a:pPr>
-              <a:t>4/6/2022</a:t>
+              <a:t>5/1/2022</a:t>
             </a:fld>
             <a:endParaRPr lang="en-US"/>
           </a:p>
@@ -18144,7 +18141,7 @@
               <a:pPr>
                 <a:defRPr/>
               </a:pPr>
-              <a:t>4/6/2022</a:t>
+              <a:t>5/1/2022</a:t>
             </a:fld>
             <a:endParaRPr lang="en-US"/>
           </a:p>
@@ -18357,7 +18354,7 @@
               <a:pPr>
                 <a:defRPr/>
               </a:pPr>
-              <a:t>4/6/2022</a:t>
+              <a:t>5/1/2022</a:t>
             </a:fld>
             <a:endParaRPr lang="en-US"/>
           </a:p>
@@ -18647,7 +18644,7 @@
               <a:pPr>
                 <a:defRPr/>
               </a:pPr>
-              <a:t>4/6/2022</a:t>
+              <a:t>5/1/2022</a:t>
             </a:fld>
             <a:endParaRPr lang="en-US"/>
           </a:p>
@@ -18921,7 +18918,7 @@
               <a:pPr>
                 <a:defRPr/>
               </a:pPr>
-              <a:t>4/6/2022</a:t>
+              <a:t>5/1/2022</a:t>
             </a:fld>
             <a:endParaRPr lang="en-US"/>
           </a:p>
@@ -19330,7 +19327,7 @@
               <a:pPr>
                 <a:defRPr/>
               </a:pPr>
-              <a:t>4/6/2022</a:t>
+              <a:t>5/1/2022</a:t>
             </a:fld>
             <a:endParaRPr lang="en-US"/>
           </a:p>
@@ -19492,7 +19489,7 @@
               <a:pPr>
                 <a:defRPr/>
               </a:pPr>
-              <a:t>4/6/2022</a:t>
+              <a:t>5/1/2022</a:t>
             </a:fld>
             <a:endParaRPr lang="en-US"/>
           </a:p>
@@ -19632,7 +19629,7 @@
               <a:pPr>
                 <a:defRPr/>
               </a:pPr>
-              <a:t>4/6/2022</a:t>
+              <a:t>5/1/2022</a:t>
             </a:fld>
             <a:endParaRPr lang="en-US"/>
           </a:p>
@@ -19952,7 +19949,7 @@
               <a:pPr>
                 <a:defRPr/>
               </a:pPr>
-              <a:t>4/6/2022</a:t>
+              <a:t>5/1/2022</a:t>
             </a:fld>
             <a:endParaRPr lang="en-US"/>
           </a:p>
@@ -20252,7 +20249,7 @@
               <a:pPr>
                 <a:defRPr/>
               </a:pPr>
-              <a:t>4/6/2022</a:t>
+              <a:t>5/1/2022</a:t>
             </a:fld>
             <a:endParaRPr lang="en-US"/>
           </a:p>
@@ -20977,7 +20974,7 @@
               <a:pPr>
                 <a:defRPr/>
               </a:pPr>
-              <a:t>4/6/2022</a:t>
+              <a:t>5/1/2022</a:t>
             </a:fld>
             <a:endParaRPr lang="en-US"/>
           </a:p>
@@ -21200,7 +21197,7 @@
               <a:pPr>
                 <a:defRPr/>
               </a:pPr>
-              <a:t>4/6/2022</a:t>
+              <a:t>5/1/2022</a:t>
             </a:fld>
             <a:endParaRPr lang="en-US"/>
           </a:p>
@@ -21443,7 +21440,7 @@
               <a:pPr>
                 <a:defRPr/>
               </a:pPr>
-              <a:t>06-04-2022</a:t>
+              <a:t>01-05-2022</a:t>
             </a:fld>
             <a:endParaRPr lang="en-IN"/>
           </a:p>
@@ -21674,7 +21671,7 @@
               <a:pPr>
                 <a:defRPr/>
               </a:pPr>
-              <a:t>06-04-2022</a:t>
+              <a:t>01-05-2022</a:t>
             </a:fld>
             <a:endParaRPr lang="en-IN"/>
           </a:p>
@@ -21971,7 +21968,7 @@
               <a:pPr>
                 <a:defRPr/>
               </a:pPr>
-              <a:t>06-04-2022</a:t>
+              <a:t>01-05-2022</a:t>
             </a:fld>
             <a:endParaRPr lang="en-IN"/>
           </a:p>
@@ -22262,7 +22259,7 @@
               <a:pPr>
                 <a:defRPr/>
               </a:pPr>
-              <a:t>06-04-2022</a:t>
+              <a:t>01-05-2022</a:t>
             </a:fld>
             <a:endParaRPr lang="en-IN"/>
           </a:p>
@@ -22689,7 +22686,7 @@
               <a:pPr>
                 <a:defRPr/>
               </a:pPr>
-              <a:t>06-04-2022</a:t>
+              <a:t>01-05-2022</a:t>
             </a:fld>
             <a:endParaRPr lang="en-IN"/>
           </a:p>
@@ -22860,7 +22857,7 @@
               <a:pPr>
                 <a:defRPr/>
               </a:pPr>
-              <a:t>06-04-2022</a:t>
+              <a:t>01-05-2022</a:t>
             </a:fld>
             <a:endParaRPr lang="en-IN"/>
           </a:p>
@@ -23000,7 +22997,7 @@
               <a:pPr>
                 <a:defRPr/>
               </a:pPr>
-              <a:t>06-04-2022</a:t>
+              <a:t>01-05-2022</a:t>
             </a:fld>
             <a:endParaRPr lang="en-IN"/>
           </a:p>
@@ -23331,7 +23328,7 @@
               <a:pPr>
                 <a:defRPr/>
               </a:pPr>
-              <a:t>06-04-2022</a:t>
+              <a:t>01-05-2022</a:t>
             </a:fld>
             <a:endParaRPr lang="en-IN"/>
           </a:p>
@@ -23835,7 +23832,7 @@
               <a:pPr>
                 <a:defRPr/>
               </a:pPr>
-              <a:t>06-04-2022</a:t>
+              <a:t>01-05-2022</a:t>
             </a:fld>
             <a:endParaRPr lang="en-IN"/>
           </a:p>
@@ -24066,7 +24063,7 @@
               <a:pPr>
                 <a:defRPr/>
               </a:pPr>
-              <a:t>06-04-2022</a:t>
+              <a:t>01-05-2022</a:t>
             </a:fld>
             <a:endParaRPr lang="en-IN"/>
           </a:p>
@@ -24297,7 +24294,7 @@
               <a:pPr>
                 <a:defRPr/>
               </a:pPr>
-              <a:t>06-04-2022</a:t>
+              <a:t>01-05-2022</a:t>
             </a:fld>
             <a:endParaRPr lang="en-IN"/>
           </a:p>
@@ -25826,7 +25823,7 @@
               <a:pPr>
                 <a:defRPr/>
               </a:pPr>
-              <a:t>4/6/2022</a:t>
+              <a:t>5/1/2022</a:t>
             </a:fld>
             <a:endParaRPr lang="en-US"/>
           </a:p>
@@ -26615,7 +26612,7 @@
               <a:pPr>
                 <a:defRPr/>
               </a:pPr>
-              <a:t>4/6/2022</a:t>
+              <a:t>5/1/2022</a:t>
             </a:fld>
             <a:endParaRPr lang="en-US"/>
           </a:p>
@@ -27404,7 +27401,7 @@
               <a:pPr>
                 <a:defRPr/>
               </a:pPr>
-              <a:t>4/6/2022</a:t>
+              <a:t>5/1/2022</a:t>
             </a:fld>
             <a:endParaRPr lang="en-US"/>
           </a:p>
@@ -28037,7 +28034,7 @@
               <a:pPr>
                 <a:defRPr/>
               </a:pPr>
-              <a:t>06-04-2022</a:t>
+              <a:t>01-05-2022</a:t>
             </a:fld>
             <a:endParaRPr lang="en-IN"/>
           </a:p>
@@ -29094,1206 +29091,6 @@
           <p:nvPr>
             <p:extLst>
               <p:ext uri="{D42A27DB-BD31-4B8C-83A1-F6EECF244321}">
-                <p14:modId xmlns:p14="http://schemas.microsoft.com/office/powerpoint/2010/main" val="1507626843"/>
-              </p:ext>
-            </p:extLst>
-          </p:nvPr>
-        </p:nvGraphicFramePr>
-        <p:xfrm>
-          <a:off x="331200" y="1397001"/>
-          <a:ext cx="8618400" cy="3196666"/>
-        </p:xfrm>
-        <a:graphic>
-          <a:graphicData uri="http://schemas.openxmlformats.org/drawingml/2006/table">
-            <a:tbl>
-              <a:tblPr bandCol="1">
-                <a:tableStyleId>{3C2FFA5D-87B4-456A-9821-1D502468CF0F}</a:tableStyleId>
-              </a:tblPr>
-              <a:tblGrid>
-                <a:gridCol w="1983600">
-                  <a:extLst>
-                    <a:ext uri="{9D8B030D-6E8A-4147-A177-3AD203B41FA5}">
-                      <a16:colId xmlns:a16="http://schemas.microsoft.com/office/drawing/2014/main" val="2102384054"/>
-                    </a:ext>
-                  </a:extLst>
-                </a:gridCol>
-                <a:gridCol w="6634800">
-                  <a:extLst>
-                    <a:ext uri="{9D8B030D-6E8A-4147-A177-3AD203B41FA5}">
-                      <a16:colId xmlns:a16="http://schemas.microsoft.com/office/drawing/2014/main" val="2948652579"/>
-                    </a:ext>
-                  </a:extLst>
-                </a:gridCol>
-              </a:tblGrid>
-              <a:tr h="629279">
-                <a:tc>
-                  <a:txBody>
-                    <a:bodyPr/>
-                    <a:lstStyle/>
-                    <a:p>
-                      <a:pPr algn="l"/>
-                      <a:r>
-                        <a:rPr lang="en-US" sz="2000" b="1" u="none" strike="noStrike" kern="1200" dirty="0">
-                          <a:solidFill>
-                            <a:schemeClr val="lt1"/>
-                          </a:solidFill>
-                          <a:effectLst/>
-                          <a:latin typeface="+mn-lt"/>
-                          <a:ea typeface="+mn-ea"/>
-                          <a:cs typeface="+mn-cs"/>
-                        </a:rPr>
-                        <a:t>TITLE</a:t>
-                      </a:r>
-                    </a:p>
-                  </a:txBody>
-                  <a:tcPr/>
-                </a:tc>
-                <a:tc>
-                  <a:txBody>
-                    <a:bodyPr/>
-                    <a:lstStyle/>
-                    <a:p>
-                      <a:pPr marL="0" marR="0" lvl="0" indent="0" algn="just" defTabSz="914400" rtl="0" eaLnBrk="1" fontAlgn="auto" latinLnBrk="0" hangingPunct="1">
-                        <a:lnSpc>
-                          <a:spcPct val="100000"/>
-                        </a:lnSpc>
-                        <a:spcBef>
-                          <a:spcPts val="0"/>
-                        </a:spcBef>
-                        <a:spcAft>
-                          <a:spcPts val="0"/>
-                        </a:spcAft>
-                        <a:buClrTx/>
-                        <a:buSzTx/>
-                        <a:buFontTx/>
-                        <a:buNone/>
-                        <a:tabLst/>
-                        <a:defRPr/>
-                      </a:pPr>
-                      <a:r>
-                        <a:rPr lang="en-US" sz="1600" b="0" i="0" u="none" strike="noStrike" kern="1200" dirty="0">
-                          <a:solidFill>
-                            <a:srgbClr val="000000"/>
-                          </a:solidFill>
-                          <a:effectLst/>
-                          <a:latin typeface="Arial" panose="020B0604020202020204" pitchFamily="34" charset="0"/>
-                          <a:ea typeface="+mn-ea"/>
-                          <a:cs typeface="Arial" panose="020B0604020202020204" pitchFamily="34" charset="0"/>
-                        </a:rPr>
-                        <a:t>Intelligent Management System of Sunshine Sports Activities for College Students</a:t>
-                      </a:r>
-                    </a:p>
-                  </a:txBody>
-                  <a:tcPr/>
-                </a:tc>
-                <a:extLst>
-                  <a:ext uri="{0D108BD9-81ED-4DB2-BD59-A6C34878D82A}">
-                    <a16:rowId xmlns:a16="http://schemas.microsoft.com/office/drawing/2014/main" val="1564620126"/>
-                  </a:ext>
-                </a:extLst>
-              </a:tr>
-              <a:tr h="1064933">
-                <a:tc>
-                  <a:txBody>
-                    <a:bodyPr/>
-                    <a:lstStyle/>
-                    <a:p>
-                      <a:pPr algn="l"/>
-                      <a:r>
-                        <a:rPr lang="en-US" sz="2000" b="1" u="none" strike="noStrike" kern="1200" dirty="0">
-                          <a:solidFill>
-                            <a:schemeClr val="lt1"/>
-                          </a:solidFill>
-                          <a:effectLst/>
-                          <a:latin typeface="+mn-lt"/>
-                          <a:ea typeface="+mn-ea"/>
-                          <a:cs typeface="+mn-cs"/>
-                        </a:rPr>
-                        <a:t>AUTHOR</a:t>
-                      </a:r>
-                    </a:p>
-                  </a:txBody>
-                  <a:tcPr/>
-                </a:tc>
-                <a:tc>
-                  <a:txBody>
-                    <a:bodyPr/>
-                    <a:lstStyle/>
-                    <a:p>
-                      <a:pPr marL="0" marR="0" lvl="0" indent="0" algn="just" defTabSz="914400" rtl="0" eaLnBrk="1" fontAlgn="auto" latinLnBrk="0" hangingPunct="1">
-                        <a:lnSpc>
-                          <a:spcPct val="100000"/>
-                        </a:lnSpc>
-                        <a:spcBef>
-                          <a:spcPts val="0"/>
-                        </a:spcBef>
-                        <a:spcAft>
-                          <a:spcPts val="0"/>
-                        </a:spcAft>
-                        <a:buClrTx/>
-                        <a:buSzTx/>
-                        <a:buFontTx/>
-                        <a:buNone/>
-                        <a:tabLst/>
-                        <a:defRPr/>
-                      </a:pPr>
-                      <a:r>
-                        <a:rPr lang="en-US" sz="1600" b="0" i="0" u="none" strike="noStrike" kern="1200" dirty="0">
-                          <a:solidFill>
-                            <a:srgbClr val="000000"/>
-                          </a:solidFill>
-                          <a:effectLst/>
-                          <a:latin typeface="Arial" panose="020B0604020202020204" pitchFamily="34" charset="0"/>
-                          <a:ea typeface="+mn-ea"/>
-                          <a:cs typeface="Arial" panose="020B0604020202020204" pitchFamily="34" charset="0"/>
-                        </a:rPr>
-                        <a:t>Y. Hui, "Intelligent Management System of Sunshine Sports Activities for College Students," 2019 International Conference on Smart Grid and Electrical Automation (ICSGEA), 2019, pp. 505-509, </a:t>
-                      </a:r>
-                      <a:r>
-                        <a:rPr lang="en-US" sz="1600" b="0" i="0" u="none" strike="noStrike" kern="1200" dirty="0" err="1">
-                          <a:solidFill>
-                            <a:srgbClr val="000000"/>
-                          </a:solidFill>
-                          <a:effectLst/>
-                          <a:latin typeface="Arial" panose="020B0604020202020204" pitchFamily="34" charset="0"/>
-                          <a:ea typeface="+mn-ea"/>
-                          <a:cs typeface="Arial" panose="020B0604020202020204" pitchFamily="34" charset="0"/>
-                        </a:rPr>
-                        <a:t>doi</a:t>
-                      </a:r>
-                      <a:r>
-                        <a:rPr lang="en-US" sz="1600" b="0" i="0" u="none" strike="noStrike" kern="1200" dirty="0">
-                          <a:solidFill>
-                            <a:srgbClr val="000000"/>
-                          </a:solidFill>
-                          <a:effectLst/>
-                          <a:latin typeface="Arial" panose="020B0604020202020204" pitchFamily="34" charset="0"/>
-                          <a:ea typeface="+mn-ea"/>
-                          <a:cs typeface="Arial" panose="020B0604020202020204" pitchFamily="34" charset="0"/>
-                        </a:rPr>
-                        <a:t>: 10.1109/ICSGEA.2019.00121.</a:t>
-                      </a:r>
-                    </a:p>
-                  </a:txBody>
-                  <a:tcPr/>
-                </a:tc>
-                <a:extLst>
-                  <a:ext uri="{0D108BD9-81ED-4DB2-BD59-A6C34878D82A}">
-                    <a16:rowId xmlns:a16="http://schemas.microsoft.com/office/drawing/2014/main" val="1417993570"/>
-                  </a:ext>
-                </a:extLst>
-              </a:tr>
-              <a:tr h="1500587">
-                <a:tc>
-                  <a:txBody>
-                    <a:bodyPr/>
-                    <a:lstStyle/>
-                    <a:p>
-                      <a:pPr marL="0" marR="0" lvl="0" indent="0" algn="l" defTabSz="914400" rtl="0" eaLnBrk="1" fontAlgn="auto" latinLnBrk="0" hangingPunct="1">
-                        <a:lnSpc>
-                          <a:spcPct val="100000"/>
-                        </a:lnSpc>
-                        <a:spcBef>
-                          <a:spcPts val="0"/>
-                        </a:spcBef>
-                        <a:spcAft>
-                          <a:spcPts val="0"/>
-                        </a:spcAft>
-                        <a:buClrTx/>
-                        <a:buSzTx/>
-                        <a:buFontTx/>
-                        <a:buNone/>
-                        <a:tabLst/>
-                        <a:defRPr/>
-                      </a:pPr>
-                      <a:r>
-                        <a:rPr lang="en-US" sz="2000" b="1" u="none" strike="noStrike" kern="1200" dirty="0">
-                          <a:solidFill>
-                            <a:schemeClr val="lt1"/>
-                          </a:solidFill>
-                          <a:effectLst/>
-                          <a:latin typeface="+mn-lt"/>
-                          <a:ea typeface="+mn-ea"/>
-                          <a:cs typeface="+mn-cs"/>
-                        </a:rPr>
-                        <a:t>AIM OF THE PAPER</a:t>
-                      </a:r>
-                    </a:p>
-                  </a:txBody>
-                  <a:tcPr/>
-                </a:tc>
-                <a:tc>
-                  <a:txBody>
-                    <a:bodyPr/>
-                    <a:lstStyle/>
-                    <a:p>
-                      <a:pPr marL="0" marR="0" lvl="0" indent="0" algn="just" defTabSz="914400" rtl="0" eaLnBrk="1" fontAlgn="auto" latinLnBrk="0" hangingPunct="1">
-                        <a:lnSpc>
-                          <a:spcPct val="100000"/>
-                        </a:lnSpc>
-                        <a:spcBef>
-                          <a:spcPts val="0"/>
-                        </a:spcBef>
-                        <a:spcAft>
-                          <a:spcPts val="0"/>
-                        </a:spcAft>
-                        <a:buClrTx/>
-                        <a:buSzTx/>
-                        <a:buFontTx/>
-                        <a:buNone/>
-                        <a:tabLst/>
-                        <a:defRPr/>
-                      </a:pPr>
-                      <a:r>
-                        <a:rPr lang="en-US" sz="1600" b="0" i="0" u="none" strike="noStrike" kern="1200" dirty="0">
-                          <a:solidFill>
-                            <a:srgbClr val="000000"/>
-                          </a:solidFill>
-                          <a:effectLst/>
-                          <a:latin typeface="Arial" panose="020B0604020202020204" pitchFamily="34" charset="0"/>
-                          <a:ea typeface="+mn-ea"/>
-                          <a:cs typeface="Arial" panose="020B0604020202020204" pitchFamily="34" charset="0"/>
-                        </a:rPr>
-                        <a:t>In this paper, the application status of sports information management system is summarized properly and pointed out the flaws in the respective field.</a:t>
-                      </a:r>
-                    </a:p>
-                  </a:txBody>
-                  <a:tcPr/>
-                </a:tc>
-                <a:extLst>
-                  <a:ext uri="{0D108BD9-81ED-4DB2-BD59-A6C34878D82A}">
-                    <a16:rowId xmlns:a16="http://schemas.microsoft.com/office/drawing/2014/main" val="3451796426"/>
-                  </a:ext>
-                </a:extLst>
-              </a:tr>
-            </a:tbl>
-          </a:graphicData>
-        </a:graphic>
-      </p:graphicFrame>
-    </p:spTree>
-    <p:extLst>
-      <p:ext uri="{BB962C8B-B14F-4D97-AF65-F5344CB8AC3E}">
-        <p14:creationId xmlns:p14="http://schemas.microsoft.com/office/powerpoint/2010/main" val="2486402360"/>
-      </p:ext>
-    </p:extLst>
-  </p:cSld>
-  <p:clrMapOvr>
-    <a:masterClrMapping/>
-  </p:clrMapOvr>
-</p:sld>
-</file>
-
-<file path=ppt/slides/slide11.xml><?xml version="1.0" encoding="utf-8"?>
-<p:sld xmlns:a="http://schemas.openxmlformats.org/drawingml/2006/main" xmlns:r="http://schemas.openxmlformats.org/officeDocument/2006/relationships" xmlns:p="http://schemas.openxmlformats.org/presentationml/2006/main">
-  <p:cSld>
-    <p:spTree>
-      <p:nvGrpSpPr>
-        <p:cNvPr id="1" name=""/>
-        <p:cNvGrpSpPr/>
-        <p:nvPr/>
-      </p:nvGrpSpPr>
-      <p:grpSpPr>
-        <a:xfrm>
-          <a:off x="0" y="0"/>
-          <a:ext cx="0" cy="0"/>
-          <a:chOff x="0" y="0"/>
-          <a:chExt cx="0" cy="0"/>
-        </a:xfrm>
-      </p:grpSpPr>
-      <p:sp>
-        <p:nvSpPr>
-          <p:cNvPr id="22531" name="Title 4">
-            <a:extLst>
-              <a:ext uri="{FF2B5EF4-FFF2-40B4-BE49-F238E27FC236}">
-                <a16:creationId xmlns:a16="http://schemas.microsoft.com/office/drawing/2014/main" id="{B68DEF6B-993C-4BCC-A395-CCA095C5ED34}"/>
-              </a:ext>
-            </a:extLst>
-          </p:cNvPr>
-          <p:cNvSpPr>
-            <a:spLocks noGrp="1"/>
-          </p:cNvSpPr>
-          <p:nvPr>
-            <p:ph type="ctrTitle"/>
-          </p:nvPr>
-        </p:nvSpPr>
-        <p:spPr bwMode="auto">
-          <a:xfrm>
-            <a:off x="1152000" y="145800"/>
-            <a:ext cx="7797600" cy="1025999"/>
-          </a:xfrm>
-          <a:noFill/>
-          <a:extLst>
-            <a:ext uri="{909E8E84-426E-40DD-AFC4-6F175D3DCCD1}">
-              <a14:hiddenFill xmlns:a14="http://schemas.microsoft.com/office/drawing/2010/main">
-                <a:solidFill>
-                  <a:srgbClr val="FFFFFF"/>
-                </a:solidFill>
-              </a14:hiddenFill>
-            </a:ext>
-            <a:ext uri="{91240B29-F687-4F45-9708-019B960494DF}">
-              <a14:hiddenLine xmlns:a14="http://schemas.microsoft.com/office/drawing/2010/main" w="9525">
-                <a:solidFill>
-                  <a:srgbClr val="000000"/>
-                </a:solidFill>
-                <a:miter lim="800000"/>
-                <a:headEnd/>
-                <a:tailEnd/>
-              </a14:hiddenLine>
-            </a:ext>
-          </a:extLst>
-        </p:spPr>
-        <p:txBody>
-          <a:bodyPr vert="horz" wrap="square" lIns="91440" tIns="45720" rIns="91440" bIns="45720" numCol="1" anchor="ctr" anchorCtr="0" compatLnSpc="1">
-            <a:prstTxWarp prst="textNoShape">
-              <a:avLst/>
-            </a:prstTxWarp>
-          </a:bodyPr>
-          <a:lstStyle/>
-          <a:p>
-            <a:r>
-              <a:rPr lang="en-IN" altLang="en-US" sz="3600" b="1" dirty="0">
-                <a:latin typeface="Arial" panose="020B0604020202020204" pitchFamily="34" charset="0"/>
-                <a:cs typeface="Arial" panose="020B0604020202020204" pitchFamily="34" charset="0"/>
-              </a:rPr>
-              <a:t>Literature survey</a:t>
-            </a:r>
-          </a:p>
-        </p:txBody>
-      </p:sp>
-      <p:graphicFrame>
-        <p:nvGraphicFramePr>
-          <p:cNvPr id="3" name="Table 3">
-            <a:extLst>
-              <a:ext uri="{FF2B5EF4-FFF2-40B4-BE49-F238E27FC236}">
-                <a16:creationId xmlns:a16="http://schemas.microsoft.com/office/drawing/2014/main" id="{5B788402-A3DC-4CA0-AD0C-D7C651C13F3D}"/>
-              </a:ext>
-            </a:extLst>
-          </p:cNvPr>
-          <p:cNvGraphicFramePr>
-            <a:graphicFrameLocks noGrp="1"/>
-          </p:cNvGraphicFramePr>
-          <p:nvPr>
-            <p:extLst>
-              <p:ext uri="{D42A27DB-BD31-4B8C-83A1-F6EECF244321}">
-                <p14:modId xmlns:p14="http://schemas.microsoft.com/office/powerpoint/2010/main" val="2664778008"/>
-              </p:ext>
-            </p:extLst>
-          </p:nvPr>
-        </p:nvGraphicFramePr>
-        <p:xfrm>
-          <a:off x="331200" y="1397001"/>
-          <a:ext cx="8618400" cy="3196666"/>
-        </p:xfrm>
-        <a:graphic>
-          <a:graphicData uri="http://schemas.openxmlformats.org/drawingml/2006/table">
-            <a:tbl>
-              <a:tblPr bandCol="1">
-                <a:tableStyleId>{3C2FFA5D-87B4-456A-9821-1D502468CF0F}</a:tableStyleId>
-              </a:tblPr>
-              <a:tblGrid>
-                <a:gridCol w="1983600">
-                  <a:extLst>
-                    <a:ext uri="{9D8B030D-6E8A-4147-A177-3AD203B41FA5}">
-                      <a16:colId xmlns:a16="http://schemas.microsoft.com/office/drawing/2014/main" val="2102384054"/>
-                    </a:ext>
-                  </a:extLst>
-                </a:gridCol>
-                <a:gridCol w="6634800">
-                  <a:extLst>
-                    <a:ext uri="{9D8B030D-6E8A-4147-A177-3AD203B41FA5}">
-                      <a16:colId xmlns:a16="http://schemas.microsoft.com/office/drawing/2014/main" val="2948652579"/>
-                    </a:ext>
-                  </a:extLst>
-                </a:gridCol>
-              </a:tblGrid>
-              <a:tr h="629279">
-                <a:tc>
-                  <a:txBody>
-                    <a:bodyPr/>
-                    <a:lstStyle/>
-                    <a:p>
-                      <a:r>
-                        <a:rPr lang="en-US" sz="2000" b="1" u="none" strike="noStrike" kern="1200" dirty="0">
-                          <a:solidFill>
-                            <a:schemeClr val="lt1"/>
-                          </a:solidFill>
-                          <a:effectLst/>
-                          <a:latin typeface="+mn-lt"/>
-                          <a:ea typeface="+mn-ea"/>
-                          <a:cs typeface="+mn-cs"/>
-                        </a:rPr>
-                        <a:t>TITLE</a:t>
-                      </a:r>
-                    </a:p>
-                  </a:txBody>
-                  <a:tcPr/>
-                </a:tc>
-                <a:tc>
-                  <a:txBody>
-                    <a:bodyPr/>
-                    <a:lstStyle/>
-                    <a:p>
-                      <a:pPr marL="0" marR="0" lvl="0" indent="0" algn="just" defTabSz="914400" rtl="0" eaLnBrk="1" fontAlgn="auto" latinLnBrk="0" hangingPunct="1">
-                        <a:lnSpc>
-                          <a:spcPct val="100000"/>
-                        </a:lnSpc>
-                        <a:spcBef>
-                          <a:spcPts val="0"/>
-                        </a:spcBef>
-                        <a:spcAft>
-                          <a:spcPts val="0"/>
-                        </a:spcAft>
-                        <a:buClrTx/>
-                        <a:buSzTx/>
-                        <a:buFontTx/>
-                        <a:buNone/>
-                        <a:tabLst/>
-                        <a:defRPr/>
-                      </a:pPr>
-                      <a:r>
-                        <a:rPr lang="en-US" sz="1600" b="0" i="0" u="none" strike="noStrike" kern="1200" dirty="0">
-                          <a:solidFill>
-                            <a:srgbClr val="000000"/>
-                          </a:solidFill>
-                          <a:effectLst/>
-                          <a:latin typeface="Arial" panose="020B0604020202020204" pitchFamily="34" charset="0"/>
-                          <a:ea typeface="+mn-ea"/>
-                          <a:cs typeface="Arial" panose="020B0604020202020204" pitchFamily="34" charset="0"/>
-                        </a:rPr>
-                        <a:t>Design Patterns and Extensibility of REST API for Networking Applications</a:t>
-                      </a:r>
-                    </a:p>
-                  </a:txBody>
-                  <a:tcPr/>
-                </a:tc>
-                <a:extLst>
-                  <a:ext uri="{0D108BD9-81ED-4DB2-BD59-A6C34878D82A}">
-                    <a16:rowId xmlns:a16="http://schemas.microsoft.com/office/drawing/2014/main" val="1564620126"/>
-                  </a:ext>
-                </a:extLst>
-              </a:tr>
-              <a:tr h="1064933">
-                <a:tc>
-                  <a:txBody>
-                    <a:bodyPr/>
-                    <a:lstStyle/>
-                    <a:p>
-                      <a:r>
-                        <a:rPr lang="en-US" sz="2000" b="1" u="none" strike="noStrike" kern="1200" dirty="0">
-                          <a:solidFill>
-                            <a:schemeClr val="lt1"/>
-                          </a:solidFill>
-                          <a:effectLst/>
-                          <a:latin typeface="+mn-lt"/>
-                          <a:ea typeface="+mn-ea"/>
-                          <a:cs typeface="+mn-cs"/>
-                        </a:rPr>
-                        <a:t>AUTHOR</a:t>
-                      </a:r>
-                    </a:p>
-                  </a:txBody>
-                  <a:tcPr/>
-                </a:tc>
-                <a:tc>
-                  <a:txBody>
-                    <a:bodyPr/>
-                    <a:lstStyle/>
-                    <a:p>
-                      <a:pPr marL="0" marR="0" lvl="0" indent="0" algn="just" defTabSz="914400" rtl="0" eaLnBrk="1" fontAlgn="auto" latinLnBrk="0" hangingPunct="1">
-                        <a:lnSpc>
-                          <a:spcPct val="100000"/>
-                        </a:lnSpc>
-                        <a:spcBef>
-                          <a:spcPts val="0"/>
-                        </a:spcBef>
-                        <a:spcAft>
-                          <a:spcPts val="0"/>
-                        </a:spcAft>
-                        <a:buClrTx/>
-                        <a:buSzTx/>
-                        <a:buFontTx/>
-                        <a:buNone/>
-                        <a:tabLst/>
-                        <a:defRPr/>
-                      </a:pPr>
-                      <a:r>
-                        <a:rPr lang="en-US" sz="1600" b="0" i="0" u="none" strike="noStrike" kern="1200" dirty="0">
-                          <a:solidFill>
-                            <a:srgbClr val="000000"/>
-                          </a:solidFill>
-                          <a:effectLst/>
-                          <a:latin typeface="Arial" panose="020B0604020202020204" pitchFamily="34" charset="0"/>
-                          <a:ea typeface="+mn-ea"/>
-                          <a:cs typeface="Arial" panose="020B0604020202020204" pitchFamily="34" charset="0"/>
-                        </a:rPr>
-                        <a:t>L. Li, W. Chou, W. Zhou and M. Luo, "Design Patterns and Extensibility of REST API for Networking Applications," in IEEE Transactions on Network and Service Management, vol. 13, no. 1, pp. 154-167, March 2016, </a:t>
-                      </a:r>
-                      <a:r>
-                        <a:rPr lang="en-US" sz="1600" b="0" i="0" u="none" strike="noStrike" kern="1200" dirty="0" err="1">
-                          <a:solidFill>
-                            <a:srgbClr val="000000"/>
-                          </a:solidFill>
-                          <a:effectLst/>
-                          <a:latin typeface="Arial" panose="020B0604020202020204" pitchFamily="34" charset="0"/>
-                          <a:ea typeface="+mn-ea"/>
-                          <a:cs typeface="Arial" panose="020B0604020202020204" pitchFamily="34" charset="0"/>
-                        </a:rPr>
-                        <a:t>doi</a:t>
-                      </a:r>
-                      <a:r>
-                        <a:rPr lang="en-US" sz="1600" b="0" i="0" u="none" strike="noStrike" kern="1200" dirty="0">
-                          <a:solidFill>
-                            <a:srgbClr val="000000"/>
-                          </a:solidFill>
-                          <a:effectLst/>
-                          <a:latin typeface="Arial" panose="020B0604020202020204" pitchFamily="34" charset="0"/>
-                          <a:ea typeface="+mn-ea"/>
-                          <a:cs typeface="Arial" panose="020B0604020202020204" pitchFamily="34" charset="0"/>
-                        </a:rPr>
-                        <a:t>: 10.1109/TNSM.2016.2516946.</a:t>
-                      </a:r>
-                    </a:p>
-                  </a:txBody>
-                  <a:tcPr/>
-                </a:tc>
-                <a:extLst>
-                  <a:ext uri="{0D108BD9-81ED-4DB2-BD59-A6C34878D82A}">
-                    <a16:rowId xmlns:a16="http://schemas.microsoft.com/office/drawing/2014/main" val="1417993570"/>
-                  </a:ext>
-                </a:extLst>
-              </a:tr>
-              <a:tr h="1500587">
-                <a:tc>
-                  <a:txBody>
-                    <a:bodyPr/>
-                    <a:lstStyle/>
-                    <a:p>
-                      <a:pPr marL="0" marR="0" lvl="0" indent="0" algn="l" defTabSz="914400" rtl="0" eaLnBrk="1" fontAlgn="auto" latinLnBrk="0" hangingPunct="1">
-                        <a:lnSpc>
-                          <a:spcPct val="100000"/>
-                        </a:lnSpc>
-                        <a:spcBef>
-                          <a:spcPts val="0"/>
-                        </a:spcBef>
-                        <a:spcAft>
-                          <a:spcPts val="0"/>
-                        </a:spcAft>
-                        <a:buClrTx/>
-                        <a:buSzTx/>
-                        <a:buFontTx/>
-                        <a:buNone/>
-                        <a:tabLst/>
-                        <a:defRPr/>
-                      </a:pPr>
-                      <a:r>
-                        <a:rPr lang="en-US" sz="2000" b="1" u="none" strike="noStrike" kern="1200" dirty="0">
-                          <a:solidFill>
-                            <a:schemeClr val="lt1"/>
-                          </a:solidFill>
-                          <a:effectLst/>
-                          <a:latin typeface="+mn-lt"/>
-                          <a:ea typeface="+mn-ea"/>
-                          <a:cs typeface="+mn-cs"/>
-                        </a:rPr>
-                        <a:t>AIM OF THE PAPER</a:t>
-                      </a:r>
-                    </a:p>
-                  </a:txBody>
-                  <a:tcPr/>
-                </a:tc>
-                <a:tc>
-                  <a:txBody>
-                    <a:bodyPr/>
-                    <a:lstStyle/>
-                    <a:p>
-                      <a:pPr marL="0" marR="0" lvl="0" indent="0" algn="just" defTabSz="914400" rtl="0" eaLnBrk="1" fontAlgn="auto" latinLnBrk="0" hangingPunct="1">
-                        <a:lnSpc>
-                          <a:spcPct val="100000"/>
-                        </a:lnSpc>
-                        <a:spcBef>
-                          <a:spcPts val="0"/>
-                        </a:spcBef>
-                        <a:spcAft>
-                          <a:spcPts val="0"/>
-                        </a:spcAft>
-                        <a:buClrTx/>
-                        <a:buSzTx/>
-                        <a:buFontTx/>
-                        <a:buNone/>
-                        <a:tabLst/>
-                        <a:defRPr/>
-                      </a:pPr>
-                      <a:r>
-                        <a:rPr lang="en-US" sz="1600" b="0" i="0" u="none" strike="noStrike" kern="1200" dirty="0">
-                          <a:solidFill>
-                            <a:srgbClr val="000000"/>
-                          </a:solidFill>
-                          <a:effectLst/>
-                          <a:latin typeface="Arial" panose="020B0604020202020204" pitchFamily="34" charset="0"/>
-                          <a:ea typeface="+mn-ea"/>
-                          <a:cs typeface="Arial" panose="020B0604020202020204" pitchFamily="34" charset="0"/>
-                        </a:rPr>
-                        <a:t>We understood REST API design pattern and it’s implementation</a:t>
-                      </a:r>
-                    </a:p>
-                  </a:txBody>
-                  <a:tcPr/>
-                </a:tc>
-                <a:extLst>
-                  <a:ext uri="{0D108BD9-81ED-4DB2-BD59-A6C34878D82A}">
-                    <a16:rowId xmlns:a16="http://schemas.microsoft.com/office/drawing/2014/main" val="3451796426"/>
-                  </a:ext>
-                </a:extLst>
-              </a:tr>
-            </a:tbl>
-          </a:graphicData>
-        </a:graphic>
-      </p:graphicFrame>
-    </p:spTree>
-    <p:extLst>
-      <p:ext uri="{BB962C8B-B14F-4D97-AF65-F5344CB8AC3E}">
-        <p14:creationId xmlns:p14="http://schemas.microsoft.com/office/powerpoint/2010/main" val="1922605544"/>
-      </p:ext>
-    </p:extLst>
-  </p:cSld>
-  <p:clrMapOvr>
-    <a:masterClrMapping/>
-  </p:clrMapOvr>
-</p:sld>
-</file>
-
-<file path=ppt/slides/slide12.xml><?xml version="1.0" encoding="utf-8"?>
-<p:sld xmlns:a="http://schemas.openxmlformats.org/drawingml/2006/main" xmlns:r="http://schemas.openxmlformats.org/officeDocument/2006/relationships" xmlns:p="http://schemas.openxmlformats.org/presentationml/2006/main">
-  <p:cSld>
-    <p:spTree>
-      <p:nvGrpSpPr>
-        <p:cNvPr id="1" name=""/>
-        <p:cNvGrpSpPr/>
-        <p:nvPr/>
-      </p:nvGrpSpPr>
-      <p:grpSpPr>
-        <a:xfrm>
-          <a:off x="0" y="0"/>
-          <a:ext cx="0" cy="0"/>
-          <a:chOff x="0" y="0"/>
-          <a:chExt cx="0" cy="0"/>
-        </a:xfrm>
-      </p:grpSpPr>
-      <p:sp>
-        <p:nvSpPr>
-          <p:cNvPr id="22531" name="Title 4">
-            <a:extLst>
-              <a:ext uri="{FF2B5EF4-FFF2-40B4-BE49-F238E27FC236}">
-                <a16:creationId xmlns:a16="http://schemas.microsoft.com/office/drawing/2014/main" id="{B68DEF6B-993C-4BCC-A395-CCA095C5ED34}"/>
-              </a:ext>
-            </a:extLst>
-          </p:cNvPr>
-          <p:cNvSpPr>
-            <a:spLocks noGrp="1"/>
-          </p:cNvSpPr>
-          <p:nvPr>
-            <p:ph type="ctrTitle"/>
-          </p:nvPr>
-        </p:nvSpPr>
-        <p:spPr bwMode="auto">
-          <a:xfrm>
-            <a:off x="1152000" y="145800"/>
-            <a:ext cx="7797600" cy="1025999"/>
-          </a:xfrm>
-          <a:noFill/>
-          <a:extLst>
-            <a:ext uri="{909E8E84-426E-40DD-AFC4-6F175D3DCCD1}">
-              <a14:hiddenFill xmlns:a14="http://schemas.microsoft.com/office/drawing/2010/main">
-                <a:solidFill>
-                  <a:srgbClr val="FFFFFF"/>
-                </a:solidFill>
-              </a14:hiddenFill>
-            </a:ext>
-            <a:ext uri="{91240B29-F687-4F45-9708-019B960494DF}">
-              <a14:hiddenLine xmlns:a14="http://schemas.microsoft.com/office/drawing/2010/main" w="9525">
-                <a:solidFill>
-                  <a:srgbClr val="000000"/>
-                </a:solidFill>
-                <a:miter lim="800000"/>
-                <a:headEnd/>
-                <a:tailEnd/>
-              </a14:hiddenLine>
-            </a:ext>
-          </a:extLst>
-        </p:spPr>
-        <p:txBody>
-          <a:bodyPr vert="horz" wrap="square" lIns="91440" tIns="45720" rIns="91440" bIns="45720" numCol="1" anchor="ctr" anchorCtr="0" compatLnSpc="1">
-            <a:prstTxWarp prst="textNoShape">
-              <a:avLst/>
-            </a:prstTxWarp>
-          </a:bodyPr>
-          <a:lstStyle/>
-          <a:p>
-            <a:r>
-              <a:rPr lang="en-IN" altLang="en-US" sz="3600" b="1" dirty="0">
-                <a:latin typeface="Arial" panose="020B0604020202020204" pitchFamily="34" charset="0"/>
-                <a:cs typeface="Arial" panose="020B0604020202020204" pitchFamily="34" charset="0"/>
-              </a:rPr>
-              <a:t>Literature survey</a:t>
-            </a:r>
-          </a:p>
-        </p:txBody>
-      </p:sp>
-      <p:graphicFrame>
-        <p:nvGraphicFramePr>
-          <p:cNvPr id="3" name="Table 2">
-            <a:extLst>
-              <a:ext uri="{FF2B5EF4-FFF2-40B4-BE49-F238E27FC236}">
-                <a16:creationId xmlns:a16="http://schemas.microsoft.com/office/drawing/2014/main" id="{0BA9E9DC-3B5C-42C0-B996-1B0A1794E14B}"/>
-              </a:ext>
-            </a:extLst>
-          </p:cNvPr>
-          <p:cNvGraphicFramePr>
-            <a:graphicFrameLocks noGrp="1"/>
-          </p:cNvGraphicFramePr>
-          <p:nvPr>
-            <p:extLst>
-              <p:ext uri="{D42A27DB-BD31-4B8C-83A1-F6EECF244321}">
-                <p14:modId xmlns:p14="http://schemas.microsoft.com/office/powerpoint/2010/main" val="346699824"/>
-              </p:ext>
-            </p:extLst>
-          </p:nvPr>
-        </p:nvGraphicFramePr>
-        <p:xfrm>
-          <a:off x="262800" y="1308600"/>
-          <a:ext cx="8686800" cy="2052000"/>
-        </p:xfrm>
-        <a:graphic>
-          <a:graphicData uri="http://schemas.openxmlformats.org/drawingml/2006/table">
-            <a:tbl>
-              <a:tblPr firstRow="1">
-                <a:tableStyleId>{5C22544A-7EE6-4342-B048-85BDC9FD1C3A}</a:tableStyleId>
-              </a:tblPr>
-              <a:tblGrid>
-                <a:gridCol w="2667600">
-                  <a:extLst>
-                    <a:ext uri="{9D8B030D-6E8A-4147-A177-3AD203B41FA5}">
-                      <a16:colId xmlns:a16="http://schemas.microsoft.com/office/drawing/2014/main" val="335921228"/>
-                    </a:ext>
-                  </a:extLst>
-                </a:gridCol>
-                <a:gridCol w="2736000">
-                  <a:extLst>
-                    <a:ext uri="{9D8B030D-6E8A-4147-A177-3AD203B41FA5}">
-                      <a16:colId xmlns:a16="http://schemas.microsoft.com/office/drawing/2014/main" val="540540298"/>
-                    </a:ext>
-                  </a:extLst>
-                </a:gridCol>
-                <a:gridCol w="3283200">
-                  <a:extLst>
-                    <a:ext uri="{9D8B030D-6E8A-4147-A177-3AD203B41FA5}">
-                      <a16:colId xmlns:a16="http://schemas.microsoft.com/office/drawing/2014/main" val="3278667484"/>
-                    </a:ext>
-                  </a:extLst>
-                </a:gridCol>
-              </a:tblGrid>
-              <a:tr h="287168">
-                <a:tc>
-                  <a:txBody>
-                    <a:bodyPr/>
-                    <a:lstStyle/>
-                    <a:p>
-                      <a:pPr algn="just" fontAlgn="b"/>
-                      <a:r>
-                        <a:rPr lang="en-US" sz="2000" u="none" strike="noStrike" dirty="0">
-                          <a:effectLst/>
-                        </a:rPr>
-                        <a:t>TITLE</a:t>
-                      </a:r>
-                      <a:endParaRPr lang="en-US" sz="2000" b="0" i="0" u="none" strike="noStrike" dirty="0">
-                        <a:solidFill>
-                          <a:srgbClr val="000000"/>
-                        </a:solidFill>
-                        <a:effectLst/>
-                        <a:latin typeface="Arial" panose="020B0604020202020204" pitchFamily="34" charset="0"/>
-                      </a:endParaRPr>
-                    </a:p>
-                  </a:txBody>
-                  <a:tcPr marL="5554" marR="5554" marT="5554" marB="0"/>
-                </a:tc>
-                <a:tc>
-                  <a:txBody>
-                    <a:bodyPr/>
-                    <a:lstStyle/>
-                    <a:p>
-                      <a:pPr algn="just" fontAlgn="b"/>
-                      <a:r>
-                        <a:rPr lang="en-US" sz="2000" u="none" strike="noStrike" dirty="0">
-                          <a:effectLst/>
-                        </a:rPr>
-                        <a:t>AUTHOR</a:t>
-                      </a:r>
-                      <a:endParaRPr lang="en-US" sz="2000" b="0" i="0" u="none" strike="noStrike" dirty="0">
-                        <a:solidFill>
-                          <a:srgbClr val="000000"/>
-                        </a:solidFill>
-                        <a:effectLst/>
-                        <a:latin typeface="Arial" panose="020B0604020202020204" pitchFamily="34" charset="0"/>
-                      </a:endParaRPr>
-                    </a:p>
-                  </a:txBody>
-                  <a:tcPr marL="5554" marR="5554" marT="5554" marB="0"/>
-                </a:tc>
-                <a:tc>
-                  <a:txBody>
-                    <a:bodyPr/>
-                    <a:lstStyle/>
-                    <a:p>
-                      <a:pPr algn="just" fontAlgn="b"/>
-                      <a:r>
-                        <a:rPr lang="en-US" sz="2000" u="none" strike="noStrike" dirty="0">
-                          <a:effectLst/>
-                        </a:rPr>
-                        <a:t>AIM OF THE PAPER</a:t>
-                      </a:r>
-                      <a:endParaRPr lang="en-US" sz="2000" b="0" i="0" u="none" strike="noStrike" dirty="0">
-                        <a:solidFill>
-                          <a:srgbClr val="000000"/>
-                        </a:solidFill>
-                        <a:effectLst/>
-                        <a:latin typeface="Arial" panose="020B0604020202020204" pitchFamily="34" charset="0"/>
-                      </a:endParaRPr>
-                    </a:p>
-                  </a:txBody>
-                  <a:tcPr marL="5554" marR="5554" marT="5554" marB="0"/>
-                </a:tc>
-                <a:extLst>
-                  <a:ext uri="{0D108BD9-81ED-4DB2-BD59-A6C34878D82A}">
-                    <a16:rowId xmlns:a16="http://schemas.microsoft.com/office/drawing/2014/main" val="2254447333"/>
-                  </a:ext>
-                </a:extLst>
-              </a:tr>
-              <a:tr h="1741646">
-                <a:tc>
-                  <a:txBody>
-                    <a:bodyPr/>
-                    <a:lstStyle/>
-                    <a:p>
-                      <a:pPr algn="just" fontAlgn="b"/>
-                      <a:r>
-                        <a:rPr lang="en-US" sz="1400" b="0" i="0" u="none" strike="noStrike" kern="1200" dirty="0">
-                          <a:solidFill>
-                            <a:srgbClr val="000000"/>
-                          </a:solidFill>
-                          <a:effectLst/>
-                          <a:latin typeface="Arial" panose="020B0604020202020204" pitchFamily="34" charset="0"/>
-                          <a:ea typeface="+mn-ea"/>
-                          <a:cs typeface="Arial" panose="020B0604020202020204" pitchFamily="34" charset="0"/>
-                        </a:rPr>
-                        <a:t>Design an MVC Model using Python for Flask Framework Development</a:t>
-                      </a:r>
-                    </a:p>
-                  </a:txBody>
-                  <a:tcPr marL="7620" marR="7620" marT="7620" marB="0"/>
-                </a:tc>
-                <a:tc>
-                  <a:txBody>
-                    <a:bodyPr/>
-                    <a:lstStyle/>
-                    <a:p>
-                      <a:pPr algn="just" fontAlgn="b"/>
-                      <a:r>
-                        <a:rPr lang="en-US" sz="1400" b="0" i="0" u="none" strike="noStrike" kern="1200" dirty="0">
-                          <a:solidFill>
-                            <a:srgbClr val="000000"/>
-                          </a:solidFill>
-                          <a:effectLst/>
-                          <a:latin typeface="Arial" panose="020B0604020202020204" pitchFamily="34" charset="0"/>
-                          <a:ea typeface="+mn-ea"/>
-                          <a:cs typeface="Arial" panose="020B0604020202020204" pitchFamily="34" charset="0"/>
-                        </a:rPr>
-                        <a:t>M. R. </a:t>
-                      </a:r>
-                      <a:r>
-                        <a:rPr lang="en-US" sz="1400" b="0" i="0" u="none" strike="noStrike" kern="1200" dirty="0" err="1">
-                          <a:solidFill>
-                            <a:srgbClr val="000000"/>
-                          </a:solidFill>
-                          <a:effectLst/>
-                          <a:latin typeface="Arial" panose="020B0604020202020204" pitchFamily="34" charset="0"/>
-                          <a:ea typeface="+mn-ea"/>
-                          <a:cs typeface="Arial" panose="020B0604020202020204" pitchFamily="34" charset="0"/>
-                        </a:rPr>
-                        <a:t>Mufid</a:t>
-                      </a:r>
-                      <a:r>
-                        <a:rPr lang="en-US" sz="1400" b="0" i="0" u="none" strike="noStrike" kern="1200" dirty="0">
-                          <a:solidFill>
-                            <a:srgbClr val="000000"/>
-                          </a:solidFill>
-                          <a:effectLst/>
-                          <a:latin typeface="Arial" panose="020B0604020202020204" pitchFamily="34" charset="0"/>
-                          <a:ea typeface="+mn-ea"/>
-                          <a:cs typeface="Arial" panose="020B0604020202020204" pitchFamily="34" charset="0"/>
-                        </a:rPr>
-                        <a:t>, A. </a:t>
-                      </a:r>
-                      <a:r>
-                        <a:rPr lang="en-US" sz="1400" b="0" i="0" u="none" strike="noStrike" kern="1200" dirty="0" err="1">
-                          <a:solidFill>
-                            <a:srgbClr val="000000"/>
-                          </a:solidFill>
-                          <a:effectLst/>
-                          <a:latin typeface="Arial" panose="020B0604020202020204" pitchFamily="34" charset="0"/>
-                          <a:ea typeface="+mn-ea"/>
-                          <a:cs typeface="Arial" panose="020B0604020202020204" pitchFamily="34" charset="0"/>
-                        </a:rPr>
-                        <a:t>Basofi</a:t>
-                      </a:r>
-                      <a:r>
-                        <a:rPr lang="en-US" sz="1400" b="0" i="0" u="none" strike="noStrike" kern="1200" dirty="0">
-                          <a:solidFill>
-                            <a:srgbClr val="000000"/>
-                          </a:solidFill>
-                          <a:effectLst/>
-                          <a:latin typeface="Arial" panose="020B0604020202020204" pitchFamily="34" charset="0"/>
-                          <a:ea typeface="+mn-ea"/>
-                          <a:cs typeface="Arial" panose="020B0604020202020204" pitchFamily="34" charset="0"/>
-                        </a:rPr>
-                        <a:t>, M. U. H. Al </a:t>
-                      </a:r>
-                      <a:r>
-                        <a:rPr lang="en-US" sz="1400" b="0" i="0" u="none" strike="noStrike" kern="1200" dirty="0" err="1">
-                          <a:solidFill>
-                            <a:srgbClr val="000000"/>
-                          </a:solidFill>
-                          <a:effectLst/>
-                          <a:latin typeface="Arial" panose="020B0604020202020204" pitchFamily="34" charset="0"/>
-                          <a:ea typeface="+mn-ea"/>
-                          <a:cs typeface="Arial" panose="020B0604020202020204" pitchFamily="34" charset="0"/>
-                        </a:rPr>
-                        <a:t>Rasyid</a:t>
-                      </a:r>
-                      <a:r>
-                        <a:rPr lang="en-US" sz="1400" b="0" i="0" u="none" strike="noStrike" kern="1200" dirty="0">
-                          <a:solidFill>
-                            <a:srgbClr val="000000"/>
-                          </a:solidFill>
-                          <a:effectLst/>
-                          <a:latin typeface="Arial" panose="020B0604020202020204" pitchFamily="34" charset="0"/>
-                          <a:ea typeface="+mn-ea"/>
-                          <a:cs typeface="Arial" panose="020B0604020202020204" pitchFamily="34" charset="0"/>
-                        </a:rPr>
-                        <a:t>, I. F. </a:t>
-                      </a:r>
-                      <a:r>
-                        <a:rPr lang="en-US" sz="1400" b="0" i="0" u="none" strike="noStrike" kern="1200" dirty="0" err="1">
-                          <a:solidFill>
-                            <a:srgbClr val="000000"/>
-                          </a:solidFill>
-                          <a:effectLst/>
-                          <a:latin typeface="Arial" panose="020B0604020202020204" pitchFamily="34" charset="0"/>
-                          <a:ea typeface="+mn-ea"/>
-                          <a:cs typeface="Arial" panose="020B0604020202020204" pitchFamily="34" charset="0"/>
-                        </a:rPr>
-                        <a:t>Rochimansyah</a:t>
-                      </a:r>
-                      <a:r>
-                        <a:rPr lang="en-US" sz="1400" b="0" i="0" u="none" strike="noStrike" kern="1200" dirty="0">
-                          <a:solidFill>
-                            <a:srgbClr val="000000"/>
-                          </a:solidFill>
-                          <a:effectLst/>
-                          <a:latin typeface="Arial" panose="020B0604020202020204" pitchFamily="34" charset="0"/>
-                          <a:ea typeface="+mn-ea"/>
-                          <a:cs typeface="Arial" panose="020B0604020202020204" pitchFamily="34" charset="0"/>
-                        </a:rPr>
-                        <a:t> and A. </a:t>
-                      </a:r>
-                      <a:r>
-                        <a:rPr lang="en-US" sz="1400" b="0" i="0" u="none" strike="noStrike" kern="1200" dirty="0" err="1">
-                          <a:solidFill>
-                            <a:srgbClr val="000000"/>
-                          </a:solidFill>
-                          <a:effectLst/>
-                          <a:latin typeface="Arial" panose="020B0604020202020204" pitchFamily="34" charset="0"/>
-                          <a:ea typeface="+mn-ea"/>
-                          <a:cs typeface="Arial" panose="020B0604020202020204" pitchFamily="34" charset="0"/>
-                        </a:rPr>
-                        <a:t>rokhim</a:t>
-                      </a:r>
-                      <a:r>
-                        <a:rPr lang="en-US" sz="1400" b="0" i="0" u="none" strike="noStrike" kern="1200" dirty="0">
-                          <a:solidFill>
-                            <a:srgbClr val="000000"/>
-                          </a:solidFill>
-                          <a:effectLst/>
-                          <a:latin typeface="Arial" panose="020B0604020202020204" pitchFamily="34" charset="0"/>
-                          <a:ea typeface="+mn-ea"/>
-                          <a:cs typeface="Arial" panose="020B0604020202020204" pitchFamily="34" charset="0"/>
-                        </a:rPr>
-                        <a:t>, "Design an MVC Model using Python for Flask Framework Development," 2019 International Electronics Symposium (IES), 2019, pp. 214-219, </a:t>
-                      </a:r>
-                      <a:r>
-                        <a:rPr lang="en-US" sz="1400" b="0" i="0" u="none" strike="noStrike" kern="1200" dirty="0" err="1">
-                          <a:solidFill>
-                            <a:srgbClr val="000000"/>
-                          </a:solidFill>
-                          <a:effectLst/>
-                          <a:latin typeface="Arial" panose="020B0604020202020204" pitchFamily="34" charset="0"/>
-                          <a:ea typeface="+mn-ea"/>
-                          <a:cs typeface="Arial" panose="020B0604020202020204" pitchFamily="34" charset="0"/>
-                        </a:rPr>
-                        <a:t>doi</a:t>
-                      </a:r>
-                      <a:r>
-                        <a:rPr lang="en-US" sz="1400" b="0" i="0" u="none" strike="noStrike" kern="1200" dirty="0">
-                          <a:solidFill>
-                            <a:srgbClr val="000000"/>
-                          </a:solidFill>
-                          <a:effectLst/>
-                          <a:latin typeface="Arial" panose="020B0604020202020204" pitchFamily="34" charset="0"/>
-                          <a:ea typeface="+mn-ea"/>
-                          <a:cs typeface="Arial" panose="020B0604020202020204" pitchFamily="34" charset="0"/>
-                        </a:rPr>
-                        <a:t>: 10.1109/ELECSYM.2019.8901656</a:t>
-                      </a:r>
-                    </a:p>
-                  </a:txBody>
-                  <a:tcPr marL="7620" marR="7620" marT="7620" marB="0"/>
-                </a:tc>
-                <a:tc>
-                  <a:txBody>
-                    <a:bodyPr/>
-                    <a:lstStyle/>
-                    <a:p>
-                      <a:pPr algn="just" fontAlgn="b"/>
-                      <a:r>
-                        <a:rPr lang="en-US" sz="1400" b="0" i="0" u="none" strike="noStrike" kern="1200" dirty="0">
-                          <a:solidFill>
-                            <a:srgbClr val="000000"/>
-                          </a:solidFill>
-                          <a:effectLst/>
-                          <a:latin typeface="Arial" panose="020B0604020202020204" pitchFamily="34" charset="0"/>
-                          <a:ea typeface="+mn-ea"/>
-                          <a:cs typeface="Arial" panose="020B0604020202020204" pitchFamily="34" charset="0"/>
-                        </a:rPr>
-                        <a:t>In this paper we understood how to apply model-view-controller model in our project to better organize our code</a:t>
-                      </a:r>
-                    </a:p>
-                  </a:txBody>
-                  <a:tcPr marL="7620" marR="7620" marT="7620" marB="0"/>
-                </a:tc>
-                <a:extLst>
-                  <a:ext uri="{0D108BD9-81ED-4DB2-BD59-A6C34878D82A}">
-                    <a16:rowId xmlns:a16="http://schemas.microsoft.com/office/drawing/2014/main" val="874216702"/>
-                  </a:ext>
-                </a:extLst>
-              </a:tr>
-            </a:tbl>
-          </a:graphicData>
-        </a:graphic>
-      </p:graphicFrame>
-    </p:spTree>
-    <p:extLst>
-      <p:ext uri="{BB962C8B-B14F-4D97-AF65-F5344CB8AC3E}">
-        <p14:creationId xmlns:p14="http://schemas.microsoft.com/office/powerpoint/2010/main" val="2338438490"/>
-      </p:ext>
-    </p:extLst>
-  </p:cSld>
-  <p:clrMapOvr>
-    <a:masterClrMapping/>
-  </p:clrMapOvr>
-</p:sld>
-</file>
-
-<file path=ppt/slides/slide13.xml><?xml version="1.0" encoding="utf-8"?>
-<p:sld xmlns:a="http://schemas.openxmlformats.org/drawingml/2006/main" xmlns:r="http://schemas.openxmlformats.org/officeDocument/2006/relationships" xmlns:p="http://schemas.openxmlformats.org/presentationml/2006/main">
-  <p:cSld>
-    <p:spTree>
-      <p:nvGrpSpPr>
-        <p:cNvPr id="1" name=""/>
-        <p:cNvGrpSpPr/>
-        <p:nvPr/>
-      </p:nvGrpSpPr>
-      <p:grpSpPr>
-        <a:xfrm>
-          <a:off x="0" y="0"/>
-          <a:ext cx="0" cy="0"/>
-          <a:chOff x="0" y="0"/>
-          <a:chExt cx="0" cy="0"/>
-        </a:xfrm>
-      </p:grpSpPr>
-      <p:sp>
-        <p:nvSpPr>
-          <p:cNvPr id="22531" name="Title 4">
-            <a:extLst>
-              <a:ext uri="{FF2B5EF4-FFF2-40B4-BE49-F238E27FC236}">
-                <a16:creationId xmlns:a16="http://schemas.microsoft.com/office/drawing/2014/main" id="{B68DEF6B-993C-4BCC-A395-CCA095C5ED34}"/>
-              </a:ext>
-            </a:extLst>
-          </p:cNvPr>
-          <p:cNvSpPr>
-            <a:spLocks noGrp="1"/>
-          </p:cNvSpPr>
-          <p:nvPr>
-            <p:ph type="ctrTitle"/>
-          </p:nvPr>
-        </p:nvSpPr>
-        <p:spPr bwMode="auto">
-          <a:xfrm>
-            <a:off x="1152000" y="145800"/>
-            <a:ext cx="7797600" cy="1025999"/>
-          </a:xfrm>
-          <a:noFill/>
-          <a:extLst>
-            <a:ext uri="{909E8E84-426E-40DD-AFC4-6F175D3DCCD1}">
-              <a14:hiddenFill xmlns:a14="http://schemas.microsoft.com/office/drawing/2010/main">
-                <a:solidFill>
-                  <a:srgbClr val="FFFFFF"/>
-                </a:solidFill>
-              </a14:hiddenFill>
-            </a:ext>
-            <a:ext uri="{91240B29-F687-4F45-9708-019B960494DF}">
-              <a14:hiddenLine xmlns:a14="http://schemas.microsoft.com/office/drawing/2010/main" w="9525">
-                <a:solidFill>
-                  <a:srgbClr val="000000"/>
-                </a:solidFill>
-                <a:miter lim="800000"/>
-                <a:headEnd/>
-                <a:tailEnd/>
-              </a14:hiddenLine>
-            </a:ext>
-          </a:extLst>
-        </p:spPr>
-        <p:txBody>
-          <a:bodyPr vert="horz" wrap="square" lIns="91440" tIns="45720" rIns="91440" bIns="45720" numCol="1" anchor="ctr" anchorCtr="0" compatLnSpc="1">
-            <a:prstTxWarp prst="textNoShape">
-              <a:avLst/>
-            </a:prstTxWarp>
-          </a:bodyPr>
-          <a:lstStyle/>
-          <a:p>
-            <a:r>
-              <a:rPr lang="en-IN" altLang="en-US" sz="3600" b="1" dirty="0">
-                <a:latin typeface="Arial" panose="020B0604020202020204" pitchFamily="34" charset="0"/>
-                <a:cs typeface="Arial" panose="020B0604020202020204" pitchFamily="34" charset="0"/>
-              </a:rPr>
-              <a:t>Literature survey</a:t>
-            </a:r>
-          </a:p>
-        </p:txBody>
-      </p:sp>
-      <p:graphicFrame>
-        <p:nvGraphicFramePr>
-          <p:cNvPr id="3" name="Table 3">
-            <a:extLst>
-              <a:ext uri="{FF2B5EF4-FFF2-40B4-BE49-F238E27FC236}">
-                <a16:creationId xmlns:a16="http://schemas.microsoft.com/office/drawing/2014/main" id="{5B788402-A3DC-4CA0-AD0C-D7C651C13F3D}"/>
-              </a:ext>
-            </a:extLst>
-          </p:cNvPr>
-          <p:cNvGraphicFramePr>
-            <a:graphicFrameLocks noGrp="1"/>
-          </p:cNvGraphicFramePr>
-          <p:nvPr>
-            <p:extLst>
-              <p:ext uri="{D42A27DB-BD31-4B8C-83A1-F6EECF244321}">
                 <p14:modId xmlns:p14="http://schemas.microsoft.com/office/powerpoint/2010/main" val="38672899"/>
               </p:ext>
             </p:extLst>
@@ -30701,7 +29498,7 @@
 </p:sld>
 </file>
 
-<file path=ppt/slides/slide14.xml><?xml version="1.0" encoding="utf-8"?>
+<file path=ppt/slides/slide11.xml><?xml version="1.0" encoding="utf-8"?>
 <p:sld xmlns:a="http://schemas.openxmlformats.org/drawingml/2006/main" xmlns:r="http://schemas.openxmlformats.org/officeDocument/2006/relationships" xmlns:p="http://schemas.openxmlformats.org/presentationml/2006/main">
   <p:cSld>
     <p:spTree>
@@ -31063,7 +29860,7 @@
 </p:sld>
 </file>
 
-<file path=ppt/slides/slide15.xml><?xml version="1.0" encoding="utf-8"?>
+<file path=ppt/slides/slide12.xml><?xml version="1.0" encoding="utf-8"?>
 <p:sld xmlns:a="http://schemas.openxmlformats.org/drawingml/2006/main" xmlns:r="http://schemas.openxmlformats.org/officeDocument/2006/relationships" xmlns:p="http://schemas.openxmlformats.org/presentationml/2006/main">
   <p:cSld>
     <p:spTree>
@@ -31226,7 +30023,7 @@
 </p:sld>
 </file>
 
-<file path=ppt/slides/slide16.xml><?xml version="1.0" encoding="utf-8"?>
+<file path=ppt/slides/slide13.xml><?xml version="1.0" encoding="utf-8"?>
 <p:sld xmlns:a="http://schemas.openxmlformats.org/drawingml/2006/main" xmlns:r="http://schemas.openxmlformats.org/officeDocument/2006/relationships" xmlns:p="http://schemas.openxmlformats.org/presentationml/2006/main">
   <p:cSld>
     <p:spTree>
@@ -31379,7 +30176,7 @@
 </p:sld>
 </file>
 
-<file path=ppt/slides/slide17.xml><?xml version="1.0" encoding="utf-8"?>
+<file path=ppt/slides/slide14.xml><?xml version="1.0" encoding="utf-8"?>
 <p:sld xmlns:a="http://schemas.openxmlformats.org/drawingml/2006/main" xmlns:r="http://schemas.openxmlformats.org/officeDocument/2006/relationships" xmlns:p="http://schemas.openxmlformats.org/presentationml/2006/main">
   <p:cSld>
     <p:spTree>
@@ -31532,7 +30329,7 @@
 </p:sld>
 </file>
 
-<file path=ppt/slides/slide18.xml><?xml version="1.0" encoding="utf-8"?>
+<file path=ppt/slides/slide15.xml><?xml version="1.0" encoding="utf-8"?>
 <p:sld xmlns:a="http://schemas.openxmlformats.org/drawingml/2006/main" xmlns:r="http://schemas.openxmlformats.org/officeDocument/2006/relationships" xmlns:p="http://schemas.openxmlformats.org/presentationml/2006/main">
   <p:cSld>
     <p:spTree>
@@ -31638,7 +30435,7 @@
 </p:sld>
 </file>
 
-<file path=ppt/slides/slide19.xml><?xml version="1.0" encoding="utf-8"?>
+<file path=ppt/slides/slide16.xml><?xml version="1.0" encoding="utf-8"?>
 <p:sld xmlns:a="http://schemas.openxmlformats.org/drawingml/2006/main" xmlns:r="http://schemas.openxmlformats.org/officeDocument/2006/relationships" xmlns:p="http://schemas.openxmlformats.org/presentationml/2006/main">
   <p:cSld>
     <p:spTree>
@@ -31753,256 +30550,7 @@
 </p:sld>
 </file>
 
-<file path=ppt/slides/slide2.xml><?xml version="1.0" encoding="utf-8"?>
-<p:sld xmlns:a="http://schemas.openxmlformats.org/drawingml/2006/main" xmlns:r="http://schemas.openxmlformats.org/officeDocument/2006/relationships" xmlns:p="http://schemas.openxmlformats.org/presentationml/2006/main">
-  <p:cSld>
-    <p:spTree>
-      <p:nvGrpSpPr>
-        <p:cNvPr id="1" name=""/>
-        <p:cNvGrpSpPr/>
-        <p:nvPr/>
-      </p:nvGrpSpPr>
-      <p:grpSpPr>
-        <a:xfrm>
-          <a:off x="0" y="0"/>
-          <a:ext cx="0" cy="0"/>
-          <a:chOff x="0" y="0"/>
-          <a:chExt cx="0" cy="0"/>
-        </a:xfrm>
-      </p:grpSpPr>
-      <p:sp>
-        <p:nvSpPr>
-          <p:cNvPr id="6" name="Rectangle 5">
-            <a:extLst>
-              <a:ext uri="{FF2B5EF4-FFF2-40B4-BE49-F238E27FC236}">
-                <a16:creationId xmlns:a16="http://schemas.microsoft.com/office/drawing/2014/main" id="{ECE4337D-E3B3-4AB7-9B14-98FA6DCF8F9F}"/>
-              </a:ext>
-            </a:extLst>
-          </p:cNvPr>
-          <p:cNvSpPr/>
-          <p:nvPr/>
-        </p:nvSpPr>
-        <p:spPr>
-          <a:xfrm>
-            <a:off x="1562100" y="214313"/>
-            <a:ext cx="6635750" cy="1062037"/>
-          </a:xfrm>
-          <a:prstGeom prst="rect">
-            <a:avLst/>
-          </a:prstGeom>
-        </p:spPr>
-        <p:txBody>
-          <a:bodyPr lIns="144000">
-            <a:spAutoFit/>
-          </a:bodyPr>
-          <a:lstStyle/>
-          <a:p>
-            <a:pPr algn="ctr">
-              <a:lnSpc>
-                <a:spcPct val="115000"/>
-              </a:lnSpc>
-              <a:spcAft>
-                <a:spcPts val="0"/>
-              </a:spcAft>
-              <a:defRPr/>
-            </a:pPr>
-            <a:br>
-              <a:rPr lang="en-US" b="1" dirty="0">
-                <a:solidFill>
-                  <a:schemeClr val="accent2">
-                    <a:lumMod val="75000"/>
-                  </a:schemeClr>
-                </a:solidFill>
-                <a:latin typeface="+mn-lt"/>
-                <a:cs typeface="Times New Roman" pitchFamily="18" charset="0"/>
-              </a:rPr>
-            </a:br>
-            <a:endParaRPr lang="en-IN" sz="4000" b="1" dirty="0">
-              <a:solidFill>
-                <a:schemeClr val="accent2">
-                  <a:lumMod val="75000"/>
-                </a:schemeClr>
-              </a:solidFill>
-              <a:latin typeface="Times New Roman" panose="02020603050405020304" pitchFamily="18" charset="0"/>
-              <a:cs typeface="Times New Roman" panose="02020603050405020304" pitchFamily="18" charset="0"/>
-            </a:endParaRPr>
-          </a:p>
-        </p:txBody>
-      </p:sp>
-      <p:sp>
-        <p:nvSpPr>
-          <p:cNvPr id="19459" name="Title 1">
-            <a:extLst>
-              <a:ext uri="{FF2B5EF4-FFF2-40B4-BE49-F238E27FC236}">
-                <a16:creationId xmlns:a16="http://schemas.microsoft.com/office/drawing/2014/main" id="{4629D73D-D71D-487D-9824-11ED897909DD}"/>
-              </a:ext>
-            </a:extLst>
-          </p:cNvPr>
-          <p:cNvSpPr>
-            <a:spLocks noGrp="1"/>
-          </p:cNvSpPr>
-          <p:nvPr>
-            <p:ph type="ctrTitle"/>
-          </p:nvPr>
-        </p:nvSpPr>
-        <p:spPr bwMode="auto">
-          <a:xfrm>
-            <a:off x="1152000" y="145800"/>
-            <a:ext cx="7797600" cy="957599"/>
-          </a:xfrm>
-          <a:noFill/>
-          <a:extLst>
-            <a:ext uri="{909E8E84-426E-40DD-AFC4-6F175D3DCCD1}">
-              <a14:hiddenFill xmlns:a14="http://schemas.microsoft.com/office/drawing/2010/main">
-                <a:solidFill>
-                  <a:srgbClr val="FFFFFF"/>
-                </a:solidFill>
-              </a14:hiddenFill>
-            </a:ext>
-            <a:ext uri="{91240B29-F687-4F45-9708-019B960494DF}">
-              <a14:hiddenLine xmlns:a14="http://schemas.microsoft.com/office/drawing/2010/main" w="9525">
-                <a:solidFill>
-                  <a:srgbClr val="000000"/>
-                </a:solidFill>
-                <a:miter lim="800000"/>
-                <a:headEnd/>
-                <a:tailEnd/>
-              </a14:hiddenLine>
-            </a:ext>
-          </a:extLst>
-        </p:spPr>
-        <p:txBody>
-          <a:bodyPr vert="horz" wrap="square" lIns="91440" tIns="45720" rIns="91440" bIns="45720" numCol="1" anchor="ctr" anchorCtr="0" compatLnSpc="1">
-            <a:prstTxWarp prst="textNoShape">
-              <a:avLst/>
-            </a:prstTxWarp>
-          </a:bodyPr>
-          <a:lstStyle/>
-          <a:p>
-            <a:r>
-              <a:rPr lang="en-US" altLang="en-US" b="1" dirty="0">
-                <a:latin typeface="Arial" panose="020B0604020202020204" pitchFamily="34" charset="0"/>
-                <a:cs typeface="Arial" panose="020B0604020202020204" pitchFamily="34" charset="0"/>
-              </a:rPr>
-              <a:t>Content</a:t>
-            </a:r>
-            <a:endParaRPr lang="en-IN" altLang="en-US" dirty="0">
-              <a:latin typeface="Arial" panose="020B0604020202020204" pitchFamily="34" charset="0"/>
-              <a:cs typeface="Arial" panose="020B0604020202020204" pitchFamily="34" charset="0"/>
-            </a:endParaRPr>
-          </a:p>
-        </p:txBody>
-      </p:sp>
-      <p:sp>
-        <p:nvSpPr>
-          <p:cNvPr id="2" name="TextBox 1">
-            <a:extLst>
-              <a:ext uri="{FF2B5EF4-FFF2-40B4-BE49-F238E27FC236}">
-                <a16:creationId xmlns:a16="http://schemas.microsoft.com/office/drawing/2014/main" id="{AE31174D-D88D-400A-8551-41B9F3261E82}"/>
-              </a:ext>
-            </a:extLst>
-          </p:cNvPr>
-          <p:cNvSpPr txBox="1"/>
-          <p:nvPr/>
-        </p:nvSpPr>
-        <p:spPr>
-          <a:xfrm>
-            <a:off x="1015200" y="1513800"/>
-            <a:ext cx="7934400" cy="3046988"/>
-          </a:xfrm>
-          <a:prstGeom prst="rect">
-            <a:avLst/>
-          </a:prstGeom>
-          <a:noFill/>
-        </p:spPr>
-        <p:txBody>
-          <a:bodyPr wrap="square" rtlCol="0">
-            <a:spAutoFit/>
-          </a:bodyPr>
-          <a:lstStyle/>
-          <a:p>
-            <a:pPr marL="457200" indent="-457200">
-              <a:buFont typeface="Arial" panose="020B0604020202020204" pitchFamily="34" charset="0"/>
-              <a:buChar char="•"/>
-            </a:pPr>
-            <a:r>
-              <a:rPr lang="en-US" sz="3200" dirty="0">
-                <a:cs typeface="Arial" panose="020B0604020202020204" pitchFamily="34" charset="0"/>
-              </a:rPr>
-              <a:t>Introduction</a:t>
-            </a:r>
-          </a:p>
-          <a:p>
-            <a:pPr marL="457200" indent="-457200">
-              <a:buFont typeface="Arial" panose="020B0604020202020204" pitchFamily="34" charset="0"/>
-              <a:buChar char="•"/>
-            </a:pPr>
-            <a:r>
-              <a:rPr lang="en-US" sz="3200" dirty="0">
-                <a:cs typeface="Arial" panose="020B0604020202020204" pitchFamily="34" charset="0"/>
-              </a:rPr>
-              <a:t>Literature survey</a:t>
-            </a:r>
-          </a:p>
-          <a:p>
-            <a:pPr marL="457200" indent="-457200">
-              <a:buFont typeface="Arial" panose="020B0604020202020204" pitchFamily="34" charset="0"/>
-              <a:buChar char="•"/>
-            </a:pPr>
-            <a:r>
-              <a:rPr lang="en-US" sz="3200" dirty="0">
-                <a:cs typeface="Arial" panose="020B0604020202020204" pitchFamily="34" charset="0"/>
-              </a:rPr>
-              <a:t>Motivation &amp; Objective</a:t>
-            </a:r>
-          </a:p>
-          <a:p>
-            <a:pPr marL="457200" indent="-457200">
-              <a:buFont typeface="Arial" panose="020B0604020202020204" pitchFamily="34" charset="0"/>
-              <a:buChar char="•"/>
-            </a:pPr>
-            <a:r>
-              <a:rPr lang="en-US" sz="3200" dirty="0">
-                <a:cs typeface="Arial" panose="020B0604020202020204" pitchFamily="34" charset="0"/>
-              </a:rPr>
-              <a:t>System architecture</a:t>
-            </a:r>
-          </a:p>
-          <a:p>
-            <a:pPr marL="457200" indent="-457200">
-              <a:buFont typeface="Arial" panose="020B0604020202020204" pitchFamily="34" charset="0"/>
-              <a:buChar char="•"/>
-            </a:pPr>
-            <a:r>
-              <a:rPr lang="en-US" sz="3200" dirty="0">
-                <a:cs typeface="Arial" panose="020B0604020202020204" pitchFamily="34" charset="0"/>
-              </a:rPr>
-              <a:t>Proposed work with methodology</a:t>
-            </a:r>
-          </a:p>
-          <a:p>
-            <a:pPr marL="457200" indent="-457200">
-              <a:buFont typeface="Arial" panose="020B0604020202020204" pitchFamily="34" charset="0"/>
-              <a:buChar char="•"/>
-            </a:pPr>
-            <a:r>
-              <a:rPr lang="en-US" sz="3200" dirty="0">
-                <a:cs typeface="Arial" panose="020B0604020202020204" pitchFamily="34" charset="0"/>
-              </a:rPr>
-              <a:t>Software and hardware requirements</a:t>
-            </a:r>
-          </a:p>
-        </p:txBody>
-      </p:sp>
-    </p:spTree>
-  </p:cSld>
-  <p:clrMapOvr>
-    <a:masterClrMapping/>
-  </p:clrMapOvr>
-</p:sld>
-</file>
-
-<file path=ppt/slides/slide20.xml><?xml version="1.0" encoding="utf-8"?>
+<file path=ppt/slides/slide17.xml><?xml version="1.0" encoding="utf-8"?>
 <p:sld xmlns:a="http://schemas.openxmlformats.org/drawingml/2006/main" xmlns:r="http://schemas.openxmlformats.org/officeDocument/2006/relationships" xmlns:p="http://schemas.openxmlformats.org/presentationml/2006/main">
   <p:cSld>
     <p:spTree>
@@ -32272,7 +30820,7 @@
 </p:sld>
 </file>
 
-<file path=ppt/slides/slide21.xml><?xml version="1.0" encoding="utf-8"?>
+<file path=ppt/slides/slide18.xml><?xml version="1.0" encoding="utf-8"?>
 <p:sld xmlns:a="http://schemas.openxmlformats.org/drawingml/2006/main" xmlns:r="http://schemas.openxmlformats.org/officeDocument/2006/relationships" xmlns:p="http://schemas.openxmlformats.org/presentationml/2006/main">
   <p:cSld>
     <p:spTree>
@@ -32546,6 +31094,255 @@
 </p:sld>
 </file>
 
+<file path=ppt/slides/slide2.xml><?xml version="1.0" encoding="utf-8"?>
+<p:sld xmlns:a="http://schemas.openxmlformats.org/drawingml/2006/main" xmlns:r="http://schemas.openxmlformats.org/officeDocument/2006/relationships" xmlns:p="http://schemas.openxmlformats.org/presentationml/2006/main">
+  <p:cSld>
+    <p:spTree>
+      <p:nvGrpSpPr>
+        <p:cNvPr id="1" name=""/>
+        <p:cNvGrpSpPr/>
+        <p:nvPr/>
+      </p:nvGrpSpPr>
+      <p:grpSpPr>
+        <a:xfrm>
+          <a:off x="0" y="0"/>
+          <a:ext cx="0" cy="0"/>
+          <a:chOff x="0" y="0"/>
+          <a:chExt cx="0" cy="0"/>
+        </a:xfrm>
+      </p:grpSpPr>
+      <p:sp>
+        <p:nvSpPr>
+          <p:cNvPr id="6" name="Rectangle 5">
+            <a:extLst>
+              <a:ext uri="{FF2B5EF4-FFF2-40B4-BE49-F238E27FC236}">
+                <a16:creationId xmlns:a16="http://schemas.microsoft.com/office/drawing/2014/main" id="{ECE4337D-E3B3-4AB7-9B14-98FA6DCF8F9F}"/>
+              </a:ext>
+            </a:extLst>
+          </p:cNvPr>
+          <p:cNvSpPr/>
+          <p:nvPr/>
+        </p:nvSpPr>
+        <p:spPr>
+          <a:xfrm>
+            <a:off x="1562100" y="214313"/>
+            <a:ext cx="6635750" cy="1062037"/>
+          </a:xfrm>
+          <a:prstGeom prst="rect">
+            <a:avLst/>
+          </a:prstGeom>
+        </p:spPr>
+        <p:txBody>
+          <a:bodyPr lIns="144000">
+            <a:spAutoFit/>
+          </a:bodyPr>
+          <a:lstStyle/>
+          <a:p>
+            <a:pPr algn="ctr">
+              <a:lnSpc>
+                <a:spcPct val="115000"/>
+              </a:lnSpc>
+              <a:spcAft>
+                <a:spcPts val="0"/>
+              </a:spcAft>
+              <a:defRPr/>
+            </a:pPr>
+            <a:br>
+              <a:rPr lang="en-US" b="1" dirty="0">
+                <a:solidFill>
+                  <a:schemeClr val="accent2">
+                    <a:lumMod val="75000"/>
+                  </a:schemeClr>
+                </a:solidFill>
+                <a:latin typeface="+mn-lt"/>
+                <a:cs typeface="Times New Roman" pitchFamily="18" charset="0"/>
+              </a:rPr>
+            </a:br>
+            <a:endParaRPr lang="en-IN" sz="4000" b="1" dirty="0">
+              <a:solidFill>
+                <a:schemeClr val="accent2">
+                  <a:lumMod val="75000"/>
+                </a:schemeClr>
+              </a:solidFill>
+              <a:latin typeface="Times New Roman" panose="02020603050405020304" pitchFamily="18" charset="0"/>
+              <a:cs typeface="Times New Roman" panose="02020603050405020304" pitchFamily="18" charset="0"/>
+            </a:endParaRPr>
+          </a:p>
+        </p:txBody>
+      </p:sp>
+      <p:sp>
+        <p:nvSpPr>
+          <p:cNvPr id="19459" name="Title 1">
+            <a:extLst>
+              <a:ext uri="{FF2B5EF4-FFF2-40B4-BE49-F238E27FC236}">
+                <a16:creationId xmlns:a16="http://schemas.microsoft.com/office/drawing/2014/main" id="{4629D73D-D71D-487D-9824-11ED897909DD}"/>
+              </a:ext>
+            </a:extLst>
+          </p:cNvPr>
+          <p:cNvSpPr>
+            <a:spLocks noGrp="1"/>
+          </p:cNvSpPr>
+          <p:nvPr>
+            <p:ph type="ctrTitle"/>
+          </p:nvPr>
+        </p:nvSpPr>
+        <p:spPr bwMode="auto">
+          <a:xfrm>
+            <a:off x="1152000" y="145800"/>
+            <a:ext cx="7797600" cy="957599"/>
+          </a:xfrm>
+          <a:noFill/>
+          <a:extLst>
+            <a:ext uri="{909E8E84-426E-40DD-AFC4-6F175D3DCCD1}">
+              <a14:hiddenFill xmlns:a14="http://schemas.microsoft.com/office/drawing/2010/main">
+                <a:solidFill>
+                  <a:srgbClr val="FFFFFF"/>
+                </a:solidFill>
+              </a14:hiddenFill>
+            </a:ext>
+            <a:ext uri="{91240B29-F687-4F45-9708-019B960494DF}">
+              <a14:hiddenLine xmlns:a14="http://schemas.microsoft.com/office/drawing/2010/main" w="9525">
+                <a:solidFill>
+                  <a:srgbClr val="000000"/>
+                </a:solidFill>
+                <a:miter lim="800000"/>
+                <a:headEnd/>
+                <a:tailEnd/>
+              </a14:hiddenLine>
+            </a:ext>
+          </a:extLst>
+        </p:spPr>
+        <p:txBody>
+          <a:bodyPr vert="horz" wrap="square" lIns="91440" tIns="45720" rIns="91440" bIns="45720" numCol="1" anchor="ctr" anchorCtr="0" compatLnSpc="1">
+            <a:prstTxWarp prst="textNoShape">
+              <a:avLst/>
+            </a:prstTxWarp>
+          </a:bodyPr>
+          <a:lstStyle/>
+          <a:p>
+            <a:r>
+              <a:rPr lang="en-US" altLang="en-US" b="1" dirty="0">
+                <a:latin typeface="Arial" panose="020B0604020202020204" pitchFamily="34" charset="0"/>
+                <a:cs typeface="Arial" panose="020B0604020202020204" pitchFamily="34" charset="0"/>
+              </a:rPr>
+              <a:t>Content</a:t>
+            </a:r>
+            <a:endParaRPr lang="en-IN" altLang="en-US" dirty="0">
+              <a:latin typeface="Arial" panose="020B0604020202020204" pitchFamily="34" charset="0"/>
+              <a:cs typeface="Arial" panose="020B0604020202020204" pitchFamily="34" charset="0"/>
+            </a:endParaRPr>
+          </a:p>
+        </p:txBody>
+      </p:sp>
+      <p:sp>
+        <p:nvSpPr>
+          <p:cNvPr id="2" name="TextBox 1">
+            <a:extLst>
+              <a:ext uri="{FF2B5EF4-FFF2-40B4-BE49-F238E27FC236}">
+                <a16:creationId xmlns:a16="http://schemas.microsoft.com/office/drawing/2014/main" id="{AE31174D-D88D-400A-8551-41B9F3261E82}"/>
+              </a:ext>
+            </a:extLst>
+          </p:cNvPr>
+          <p:cNvSpPr txBox="1"/>
+          <p:nvPr/>
+        </p:nvSpPr>
+        <p:spPr>
+          <a:xfrm>
+            <a:off x="1015200" y="1513800"/>
+            <a:ext cx="7934400" cy="3046988"/>
+          </a:xfrm>
+          <a:prstGeom prst="rect">
+            <a:avLst/>
+          </a:prstGeom>
+          <a:noFill/>
+        </p:spPr>
+        <p:txBody>
+          <a:bodyPr wrap="square" rtlCol="0">
+            <a:spAutoFit/>
+          </a:bodyPr>
+          <a:lstStyle/>
+          <a:p>
+            <a:pPr marL="457200" indent="-457200">
+              <a:buFont typeface="Arial" panose="020B0604020202020204" pitchFamily="34" charset="0"/>
+              <a:buChar char="•"/>
+            </a:pPr>
+            <a:r>
+              <a:rPr lang="en-US" sz="3200" dirty="0">
+                <a:cs typeface="Arial" panose="020B0604020202020204" pitchFamily="34" charset="0"/>
+              </a:rPr>
+              <a:t>Introduction</a:t>
+            </a:r>
+          </a:p>
+          <a:p>
+            <a:pPr marL="457200" indent="-457200">
+              <a:buFont typeface="Arial" panose="020B0604020202020204" pitchFamily="34" charset="0"/>
+              <a:buChar char="•"/>
+            </a:pPr>
+            <a:r>
+              <a:rPr lang="en-US" sz="3200" dirty="0">
+                <a:cs typeface="Arial" panose="020B0604020202020204" pitchFamily="34" charset="0"/>
+              </a:rPr>
+              <a:t>Literature survey</a:t>
+            </a:r>
+          </a:p>
+          <a:p>
+            <a:pPr marL="457200" indent="-457200">
+              <a:buFont typeface="Arial" panose="020B0604020202020204" pitchFamily="34" charset="0"/>
+              <a:buChar char="•"/>
+            </a:pPr>
+            <a:r>
+              <a:rPr lang="en-US" sz="3200" dirty="0">
+                <a:cs typeface="Arial" panose="020B0604020202020204" pitchFamily="34" charset="0"/>
+              </a:rPr>
+              <a:t>Motivation &amp; Objective</a:t>
+            </a:r>
+          </a:p>
+          <a:p>
+            <a:pPr marL="457200" indent="-457200">
+              <a:buFont typeface="Arial" panose="020B0604020202020204" pitchFamily="34" charset="0"/>
+              <a:buChar char="•"/>
+            </a:pPr>
+            <a:r>
+              <a:rPr lang="en-US" sz="3200" dirty="0">
+                <a:cs typeface="Arial" panose="020B0604020202020204" pitchFamily="34" charset="0"/>
+              </a:rPr>
+              <a:t>System architecture</a:t>
+            </a:r>
+          </a:p>
+          <a:p>
+            <a:pPr marL="457200" indent="-457200">
+              <a:buFont typeface="Arial" panose="020B0604020202020204" pitchFamily="34" charset="0"/>
+              <a:buChar char="•"/>
+            </a:pPr>
+            <a:r>
+              <a:rPr lang="en-US" sz="3200" dirty="0">
+                <a:cs typeface="Arial" panose="020B0604020202020204" pitchFamily="34" charset="0"/>
+              </a:rPr>
+              <a:t>Proposed work with methodology</a:t>
+            </a:r>
+          </a:p>
+          <a:p>
+            <a:pPr marL="457200" indent="-457200">
+              <a:buFont typeface="Arial" panose="020B0604020202020204" pitchFamily="34" charset="0"/>
+              <a:buChar char="•"/>
+            </a:pPr>
+            <a:r>
+              <a:rPr lang="en-US" sz="3200" dirty="0">
+                <a:cs typeface="Arial" panose="020B0604020202020204" pitchFamily="34" charset="0"/>
+              </a:rPr>
+              <a:t>Software and hardware requirements</a:t>
+            </a:r>
+          </a:p>
+        </p:txBody>
+      </p:sp>
+    </p:spTree>
+  </p:cSld>
+  <p:clrMapOvr>
+    <a:masterClrMapping/>
+  </p:clrMapOvr>
+</p:sld>
+</file>
+
 <file path=ppt/slides/slide3.xml><?xml version="1.0" encoding="utf-8"?>
 <p:sld xmlns:a="http://schemas.openxmlformats.org/drawingml/2006/main" xmlns:r="http://schemas.openxmlformats.org/officeDocument/2006/relationships" xmlns:p="http://schemas.openxmlformats.org/presentationml/2006/main">
   <p:cSld>
@@ -32996,447 +31793,6 @@
 </file>
 
 <file path=ppt/slides/slide6.xml><?xml version="1.0" encoding="utf-8"?>
-<p:sld xmlns:a="http://schemas.openxmlformats.org/drawingml/2006/main" xmlns:r="http://schemas.openxmlformats.org/officeDocument/2006/relationships" xmlns:p="http://schemas.openxmlformats.org/presentationml/2006/main" show="0">
-  <p:cSld>
-    <p:spTree>
-      <p:nvGrpSpPr>
-        <p:cNvPr id="1" name=""/>
-        <p:cNvGrpSpPr/>
-        <p:nvPr/>
-      </p:nvGrpSpPr>
-      <p:grpSpPr>
-        <a:xfrm>
-          <a:off x="0" y="0"/>
-          <a:ext cx="0" cy="0"/>
-          <a:chOff x="0" y="0"/>
-          <a:chExt cx="0" cy="0"/>
-        </a:xfrm>
-      </p:grpSpPr>
-      <p:sp>
-        <p:nvSpPr>
-          <p:cNvPr id="22531" name="Title 4">
-            <a:extLst>
-              <a:ext uri="{FF2B5EF4-FFF2-40B4-BE49-F238E27FC236}">
-                <a16:creationId xmlns:a16="http://schemas.microsoft.com/office/drawing/2014/main" id="{B68DEF6B-993C-4BCC-A395-CCA095C5ED34}"/>
-              </a:ext>
-            </a:extLst>
-          </p:cNvPr>
-          <p:cNvSpPr>
-            <a:spLocks noGrp="1"/>
-          </p:cNvSpPr>
-          <p:nvPr>
-            <p:ph type="ctrTitle"/>
-          </p:nvPr>
-        </p:nvSpPr>
-        <p:spPr bwMode="auto">
-          <a:xfrm>
-            <a:off x="1152000" y="145800"/>
-            <a:ext cx="7797600" cy="1025999"/>
-          </a:xfrm>
-          <a:noFill/>
-          <a:extLst>
-            <a:ext uri="{909E8E84-426E-40DD-AFC4-6F175D3DCCD1}">
-              <a14:hiddenFill xmlns:a14="http://schemas.microsoft.com/office/drawing/2010/main">
-                <a:solidFill>
-                  <a:srgbClr val="FFFFFF"/>
-                </a:solidFill>
-              </a14:hiddenFill>
-            </a:ext>
-            <a:ext uri="{91240B29-F687-4F45-9708-019B960494DF}">
-              <a14:hiddenLine xmlns:a14="http://schemas.microsoft.com/office/drawing/2010/main" w="9525">
-                <a:solidFill>
-                  <a:srgbClr val="000000"/>
-                </a:solidFill>
-                <a:miter lim="800000"/>
-                <a:headEnd/>
-                <a:tailEnd/>
-              </a14:hiddenLine>
-            </a:ext>
-          </a:extLst>
-        </p:spPr>
-        <p:txBody>
-          <a:bodyPr vert="horz" wrap="square" lIns="91440" tIns="45720" rIns="91440" bIns="45720" numCol="1" anchor="ctr" anchorCtr="0" compatLnSpc="1">
-            <a:prstTxWarp prst="textNoShape">
-              <a:avLst/>
-            </a:prstTxWarp>
-          </a:bodyPr>
-          <a:lstStyle/>
-          <a:p>
-            <a:r>
-              <a:rPr lang="en-IN" altLang="en-US" sz="3600" b="1" dirty="0">
-                <a:latin typeface="Arial" panose="020B0604020202020204" pitchFamily="34" charset="0"/>
-                <a:cs typeface="Arial" panose="020B0604020202020204" pitchFamily="34" charset="0"/>
-              </a:rPr>
-              <a:t>Literature survey</a:t>
-            </a:r>
-          </a:p>
-        </p:txBody>
-      </p:sp>
-      <p:graphicFrame>
-        <p:nvGraphicFramePr>
-          <p:cNvPr id="2" name="Table 1">
-            <a:extLst>
-              <a:ext uri="{FF2B5EF4-FFF2-40B4-BE49-F238E27FC236}">
-                <a16:creationId xmlns:a16="http://schemas.microsoft.com/office/drawing/2014/main" id="{CF983BD4-D56F-43C1-88AE-117226B11BF1}"/>
-              </a:ext>
-            </a:extLst>
-          </p:cNvPr>
-          <p:cNvGraphicFramePr>
-            <a:graphicFrameLocks noGrp="1"/>
-          </p:cNvGraphicFramePr>
-          <p:nvPr>
-            <p:extLst>
-              <p:ext uri="{D42A27DB-BD31-4B8C-83A1-F6EECF244321}">
-                <p14:modId xmlns:p14="http://schemas.microsoft.com/office/powerpoint/2010/main" val="4187055127"/>
-              </p:ext>
-            </p:extLst>
-          </p:nvPr>
-        </p:nvGraphicFramePr>
-        <p:xfrm>
-          <a:off x="262800" y="1308600"/>
-          <a:ext cx="8686800" cy="5176197"/>
-        </p:xfrm>
-        <a:graphic>
-          <a:graphicData uri="http://schemas.openxmlformats.org/drawingml/2006/table">
-            <a:tbl>
-              <a:tblPr firstRow="1">
-                <a:tableStyleId>{5C22544A-7EE6-4342-B048-85BDC9FD1C3A}</a:tableStyleId>
-              </a:tblPr>
-              <a:tblGrid>
-                <a:gridCol w="2667600">
-                  <a:extLst>
-                    <a:ext uri="{9D8B030D-6E8A-4147-A177-3AD203B41FA5}">
-                      <a16:colId xmlns:a16="http://schemas.microsoft.com/office/drawing/2014/main" val="335921228"/>
-                    </a:ext>
-                  </a:extLst>
-                </a:gridCol>
-                <a:gridCol w="2736000">
-                  <a:extLst>
-                    <a:ext uri="{9D8B030D-6E8A-4147-A177-3AD203B41FA5}">
-                      <a16:colId xmlns:a16="http://schemas.microsoft.com/office/drawing/2014/main" val="540540298"/>
-                    </a:ext>
-                  </a:extLst>
-                </a:gridCol>
-                <a:gridCol w="3283200">
-                  <a:extLst>
-                    <a:ext uri="{9D8B030D-6E8A-4147-A177-3AD203B41FA5}">
-                      <a16:colId xmlns:a16="http://schemas.microsoft.com/office/drawing/2014/main" val="3278667484"/>
-                    </a:ext>
-                  </a:extLst>
-                </a:gridCol>
-              </a:tblGrid>
-              <a:tr h="287168">
-                <a:tc>
-                  <a:txBody>
-                    <a:bodyPr/>
-                    <a:lstStyle/>
-                    <a:p>
-                      <a:pPr algn="just" fontAlgn="b"/>
-                      <a:r>
-                        <a:rPr lang="en-US" sz="2000" u="none" strike="noStrike" dirty="0">
-                          <a:effectLst/>
-                        </a:rPr>
-                        <a:t>TITLE</a:t>
-                      </a:r>
-                      <a:endParaRPr lang="en-US" sz="2000" b="0" i="0" u="none" strike="noStrike" dirty="0">
-                        <a:solidFill>
-                          <a:srgbClr val="000000"/>
-                        </a:solidFill>
-                        <a:effectLst/>
-                        <a:latin typeface="Arial" panose="020B0604020202020204" pitchFamily="34" charset="0"/>
-                      </a:endParaRPr>
-                    </a:p>
-                  </a:txBody>
-                  <a:tcPr marL="5554" marR="5554" marT="5554" marB="0"/>
-                </a:tc>
-                <a:tc>
-                  <a:txBody>
-                    <a:bodyPr/>
-                    <a:lstStyle/>
-                    <a:p>
-                      <a:pPr algn="just" fontAlgn="b"/>
-                      <a:r>
-                        <a:rPr lang="en-US" sz="2000" u="none" strike="noStrike" dirty="0">
-                          <a:effectLst/>
-                        </a:rPr>
-                        <a:t>AUTHOR</a:t>
-                      </a:r>
-                      <a:endParaRPr lang="en-US" sz="2000" b="0" i="0" u="none" strike="noStrike" dirty="0">
-                        <a:solidFill>
-                          <a:srgbClr val="000000"/>
-                        </a:solidFill>
-                        <a:effectLst/>
-                        <a:latin typeface="Arial" panose="020B0604020202020204" pitchFamily="34" charset="0"/>
-                      </a:endParaRPr>
-                    </a:p>
-                  </a:txBody>
-                  <a:tcPr marL="5554" marR="5554" marT="5554" marB="0"/>
-                </a:tc>
-                <a:tc>
-                  <a:txBody>
-                    <a:bodyPr/>
-                    <a:lstStyle/>
-                    <a:p>
-                      <a:pPr algn="just" fontAlgn="b"/>
-                      <a:r>
-                        <a:rPr lang="en-US" sz="2000" u="none" strike="noStrike" dirty="0">
-                          <a:effectLst/>
-                        </a:rPr>
-                        <a:t>AIM OF THE PAPER</a:t>
-                      </a:r>
-                      <a:endParaRPr lang="en-US" sz="2000" b="0" i="0" u="none" strike="noStrike" dirty="0">
-                        <a:solidFill>
-                          <a:srgbClr val="000000"/>
-                        </a:solidFill>
-                        <a:effectLst/>
-                        <a:latin typeface="Arial" panose="020B0604020202020204" pitchFamily="34" charset="0"/>
-                      </a:endParaRPr>
-                    </a:p>
-                  </a:txBody>
-                  <a:tcPr marL="5554" marR="5554" marT="5554" marB="0"/>
-                </a:tc>
-                <a:extLst>
-                  <a:ext uri="{0D108BD9-81ED-4DB2-BD59-A6C34878D82A}">
-                    <a16:rowId xmlns:a16="http://schemas.microsoft.com/office/drawing/2014/main" val="2254447333"/>
-                  </a:ext>
-                </a:extLst>
-              </a:tr>
-              <a:tr h="2726702">
-                <a:tc>
-                  <a:txBody>
-                    <a:bodyPr/>
-                    <a:lstStyle/>
-                    <a:p>
-                      <a:pPr algn="just" fontAlgn="b"/>
-                      <a:r>
-                        <a:rPr lang="en-US" sz="1400" b="0" i="0" u="none" strike="noStrike" kern="1200" dirty="0">
-                          <a:solidFill>
-                            <a:srgbClr val="000000"/>
-                          </a:solidFill>
-                          <a:effectLst/>
-                          <a:latin typeface="Arial" panose="020B0604020202020204" pitchFamily="34" charset="0"/>
-                          <a:ea typeface="+mn-ea"/>
-                          <a:cs typeface="Arial" panose="020B0604020202020204" pitchFamily="34" charset="0"/>
-                        </a:rPr>
-                        <a:t>Research on Sports Computer Integrated Management System Based on Network Environment under the Background of Smart Sports</a:t>
-                      </a:r>
-                    </a:p>
-                  </a:txBody>
-                  <a:tcPr marL="5541" marR="5541" marT="5541" marB="0"/>
-                </a:tc>
-                <a:tc>
-                  <a:txBody>
-                    <a:bodyPr/>
-                    <a:lstStyle/>
-                    <a:p>
-                      <a:pPr algn="just" fontAlgn="b"/>
-                      <a:r>
-                        <a:rPr lang="en-US" sz="1400" b="0" i="0" u="none" strike="noStrike" kern="1200" dirty="0">
-                          <a:solidFill>
-                            <a:srgbClr val="000000"/>
-                          </a:solidFill>
-                          <a:effectLst/>
-                          <a:latin typeface="Arial" panose="020B0604020202020204" pitchFamily="34" charset="0"/>
-                          <a:ea typeface="+mn-ea"/>
-                          <a:cs typeface="Arial" panose="020B0604020202020204" pitchFamily="34" charset="0"/>
-                        </a:rPr>
-                        <a:t>Z. Cao, "Research on Sports Computer Integrated Management System Based on Network Environment under the Background of Smart Sports," 2021 IEEE Asia-Pacific Conference on Image Processing, Electronics and Computers (IPEC), 2021, pp. 1108-1111, </a:t>
-                      </a:r>
-                      <a:r>
-                        <a:rPr lang="en-US" sz="1400" b="0" i="0" u="none" strike="noStrike" kern="1200" dirty="0" err="1">
-                          <a:solidFill>
-                            <a:srgbClr val="000000"/>
-                          </a:solidFill>
-                          <a:effectLst/>
-                          <a:latin typeface="Arial" panose="020B0604020202020204" pitchFamily="34" charset="0"/>
-                          <a:ea typeface="+mn-ea"/>
-                          <a:cs typeface="Arial" panose="020B0604020202020204" pitchFamily="34" charset="0"/>
-                        </a:rPr>
-                        <a:t>doi</a:t>
-                      </a:r>
-                      <a:r>
-                        <a:rPr lang="en-US" sz="1400" b="0" i="0" u="none" strike="noStrike" kern="1200" dirty="0">
-                          <a:solidFill>
-                            <a:srgbClr val="000000"/>
-                          </a:solidFill>
-                          <a:effectLst/>
-                          <a:latin typeface="Arial" panose="020B0604020202020204" pitchFamily="34" charset="0"/>
-                          <a:ea typeface="+mn-ea"/>
-                          <a:cs typeface="Arial" panose="020B0604020202020204" pitchFamily="34" charset="0"/>
-                        </a:rPr>
-                        <a:t>: 10.1109/IPEC51340.2021.9421348.</a:t>
-                      </a:r>
-                    </a:p>
-                  </a:txBody>
-                  <a:tcPr marL="5541" marR="5541" marT="5541" marB="0"/>
-                </a:tc>
-                <a:tc>
-                  <a:txBody>
-                    <a:bodyPr/>
-                    <a:lstStyle/>
-                    <a:p>
-                      <a:pPr algn="just" fontAlgn="b"/>
-                      <a:r>
-                        <a:rPr lang="en-US" sz="1400" b="0" i="0" u="none" strike="noStrike" kern="1200" dirty="0">
-                          <a:solidFill>
-                            <a:srgbClr val="000000"/>
-                          </a:solidFill>
-                          <a:effectLst/>
-                          <a:latin typeface="Arial" panose="020B0604020202020204" pitchFamily="34" charset="0"/>
-                          <a:ea typeface="+mn-ea"/>
-                          <a:cs typeface="Arial" panose="020B0604020202020204" pitchFamily="34" charset="0"/>
-                        </a:rPr>
-                        <a:t>development of computer and network technology for physical education management network systems. applied modern computer and network technology to school physical education teaching and management under the background of intelligent sports. make computer technology and network management system better developed and applied in school physical education and network management system better serve school physical education.</a:t>
-                      </a:r>
-                    </a:p>
-                  </a:txBody>
-                  <a:tcPr marL="5541" marR="5541" marT="5541" marB="0"/>
-                </a:tc>
-                <a:extLst>
-                  <a:ext uri="{0D108BD9-81ED-4DB2-BD59-A6C34878D82A}">
-                    <a16:rowId xmlns:a16="http://schemas.microsoft.com/office/drawing/2014/main" val="874216702"/>
-                  </a:ext>
-                </a:extLst>
-              </a:tr>
-              <a:tr h="1979329">
-                <a:tc>
-                  <a:txBody>
-                    <a:bodyPr/>
-                    <a:lstStyle/>
-                    <a:p>
-                      <a:pPr algn="just" fontAlgn="b"/>
-                      <a:r>
-                        <a:rPr lang="en-US" sz="1400" b="0" i="0" u="none" strike="noStrike" kern="1200" dirty="0">
-                          <a:solidFill>
-                            <a:srgbClr val="000000"/>
-                          </a:solidFill>
-                          <a:effectLst/>
-                          <a:latin typeface="Arial" panose="020B0604020202020204" pitchFamily="34" charset="0"/>
-                          <a:ea typeface="+mn-ea"/>
-                          <a:cs typeface="Arial" panose="020B0604020202020204" pitchFamily="34" charset="0"/>
-                        </a:rPr>
-                        <a:t>The Theoretical Construction and Application System Development Study of Sports Information Management</a:t>
-                      </a:r>
-                    </a:p>
-                  </a:txBody>
-                  <a:tcPr marL="5541" marR="5541" marT="5541" marB="0"/>
-                </a:tc>
-                <a:tc>
-                  <a:txBody>
-                    <a:bodyPr/>
-                    <a:lstStyle/>
-                    <a:p>
-                      <a:pPr algn="just" fontAlgn="b"/>
-                      <a:r>
-                        <a:rPr lang="en-US" sz="1400" b="0" i="0" u="none" strike="noStrike" kern="1200" dirty="0">
-                          <a:solidFill>
-                            <a:srgbClr val="000000"/>
-                          </a:solidFill>
-                          <a:effectLst/>
-                          <a:latin typeface="Arial" panose="020B0604020202020204" pitchFamily="34" charset="0"/>
-                          <a:ea typeface="+mn-ea"/>
-                          <a:cs typeface="Arial" panose="020B0604020202020204" pitchFamily="34" charset="0"/>
-                        </a:rPr>
-                        <a:t>D. </a:t>
-                      </a:r>
-                      <a:r>
-                        <a:rPr lang="en-US" sz="1400" b="0" i="0" u="none" strike="noStrike" kern="1200" dirty="0" err="1">
-                          <a:solidFill>
-                            <a:srgbClr val="000000"/>
-                          </a:solidFill>
-                          <a:effectLst/>
-                          <a:latin typeface="Arial" panose="020B0604020202020204" pitchFamily="34" charset="0"/>
-                          <a:ea typeface="+mn-ea"/>
-                          <a:cs typeface="Arial" panose="020B0604020202020204" pitchFamily="34" charset="0"/>
-                        </a:rPr>
-                        <a:t>Jinguo</a:t>
-                      </a:r>
-                      <a:r>
-                        <a:rPr lang="en-US" sz="1400" b="0" i="0" u="none" strike="noStrike" kern="1200" dirty="0">
-                          <a:solidFill>
-                            <a:srgbClr val="000000"/>
-                          </a:solidFill>
-                          <a:effectLst/>
-                          <a:latin typeface="Arial" panose="020B0604020202020204" pitchFamily="34" charset="0"/>
-                          <a:ea typeface="+mn-ea"/>
-                          <a:cs typeface="Arial" panose="020B0604020202020204" pitchFamily="34" charset="0"/>
-                        </a:rPr>
-                        <a:t>, "The Theoretical Construction and Application System Development Study of Sports Information Management," 2020 IEEE International Conference on Power, Intelligent Computing and Systems (ICPICS), 2020, pp. 526-529, </a:t>
-                      </a:r>
-                      <a:r>
-                        <a:rPr lang="en-US" sz="1400" b="0" i="0" u="none" strike="noStrike" kern="1200" dirty="0" err="1">
-                          <a:solidFill>
-                            <a:srgbClr val="000000"/>
-                          </a:solidFill>
-                          <a:effectLst/>
-                          <a:latin typeface="Arial" panose="020B0604020202020204" pitchFamily="34" charset="0"/>
-                          <a:ea typeface="+mn-ea"/>
-                          <a:cs typeface="Arial" panose="020B0604020202020204" pitchFamily="34" charset="0"/>
-                        </a:rPr>
-                        <a:t>doi</a:t>
-                      </a:r>
-                      <a:r>
-                        <a:rPr lang="en-US" sz="1400" b="0" i="0" u="none" strike="noStrike" kern="1200" dirty="0">
-                          <a:solidFill>
-                            <a:srgbClr val="000000"/>
-                          </a:solidFill>
-                          <a:effectLst/>
-                          <a:latin typeface="Arial" panose="020B0604020202020204" pitchFamily="34" charset="0"/>
-                          <a:ea typeface="+mn-ea"/>
-                          <a:cs typeface="Arial" panose="020B0604020202020204" pitchFamily="34" charset="0"/>
-                        </a:rPr>
-                        <a:t>: 10.1109/ICPICS50287.2020.9202135.</a:t>
-                      </a:r>
-                    </a:p>
-                  </a:txBody>
-                  <a:tcPr marL="5541" marR="5541" marT="5541" marB="0"/>
-                </a:tc>
-                <a:tc>
-                  <a:txBody>
-                    <a:bodyPr/>
-                    <a:lstStyle/>
-                    <a:p>
-                      <a:pPr algn="just" fontAlgn="b"/>
-                      <a:r>
-                        <a:rPr lang="en-US" sz="1400" b="0" i="0" u="none" strike="noStrike" kern="1200" dirty="0">
-                          <a:solidFill>
-                            <a:srgbClr val="000000"/>
-                          </a:solidFill>
-                          <a:effectLst/>
-                          <a:latin typeface="Arial" panose="020B0604020202020204" pitchFamily="34" charset="0"/>
-                          <a:ea typeface="+mn-ea"/>
-                          <a:cs typeface="Arial" panose="020B0604020202020204" pitchFamily="34" charset="0"/>
-                        </a:rPr>
-                        <a:t>In this paper, an intelligent management system is designed for college student's sports activities based on integration of various wireless technology and web services.</a:t>
-                      </a:r>
-                    </a:p>
-                  </a:txBody>
-                  <a:tcPr marL="5541" marR="5541" marT="5541" marB="0"/>
-                </a:tc>
-                <a:extLst>
-                  <a:ext uri="{0D108BD9-81ED-4DB2-BD59-A6C34878D82A}">
-                    <a16:rowId xmlns:a16="http://schemas.microsoft.com/office/drawing/2014/main" val="3840934179"/>
-                  </a:ext>
-                </a:extLst>
-              </a:tr>
-            </a:tbl>
-          </a:graphicData>
-        </a:graphic>
-      </p:graphicFrame>
-    </p:spTree>
-    <p:extLst>
-      <p:ext uri="{BB962C8B-B14F-4D97-AF65-F5344CB8AC3E}">
-        <p14:creationId xmlns:p14="http://schemas.microsoft.com/office/powerpoint/2010/main" val="3238329899"/>
-      </p:ext>
-    </p:extLst>
-  </p:cSld>
-  <p:clrMapOvr>
-    <a:masterClrMapping/>
-  </p:clrMapOvr>
-</p:sld>
-</file>
-
-<file path=ppt/slides/slide7.xml><?xml version="1.0" encoding="utf-8"?>
 <p:sld xmlns:a="http://schemas.openxmlformats.org/drawingml/2006/main" xmlns:r="http://schemas.openxmlformats.org/officeDocument/2006/relationships" xmlns:p="http://schemas.openxmlformats.org/presentationml/2006/main">
   <p:cSld>
     <p:spTree>
@@ -33800,7 +32156,7 @@
 </p:sld>
 </file>
 
-<file path=ppt/slides/slide8.xml><?xml version="1.0" encoding="utf-8"?>
+<file path=ppt/slides/slide7.xml><?xml version="1.0" encoding="utf-8"?>
 <p:sld xmlns:a="http://schemas.openxmlformats.org/drawingml/2006/main" xmlns:r="http://schemas.openxmlformats.org/officeDocument/2006/relationships" xmlns:p="http://schemas.openxmlformats.org/presentationml/2006/main">
   <p:cSld>
     <p:spTree>
@@ -34203,7 +32559,7 @@
 </p:sld>
 </file>
 
-<file path=ppt/slides/slide9.xml><?xml version="1.0" encoding="utf-8"?>
+<file path=ppt/slides/slide8.xml><?xml version="1.0" encoding="utf-8"?>
 <p:sld xmlns:a="http://schemas.openxmlformats.org/drawingml/2006/main" xmlns:r="http://schemas.openxmlformats.org/officeDocument/2006/relationships" xmlns:p="http://schemas.openxmlformats.org/presentationml/2006/main">
   <p:cSld>
     <p:spTree>
@@ -34282,10 +32638,10 @@
       </p:sp>
       <p:graphicFrame>
         <p:nvGraphicFramePr>
-          <p:cNvPr id="3" name="Table 2">
+          <p:cNvPr id="3" name="Table 3">
             <a:extLst>
               <a:ext uri="{FF2B5EF4-FFF2-40B4-BE49-F238E27FC236}">
-                <a16:creationId xmlns:a16="http://schemas.microsoft.com/office/drawing/2014/main" id="{0BA9E9DC-3B5C-42C0-B996-1B0A1794E14B}"/>
+                <a16:creationId xmlns:a16="http://schemas.microsoft.com/office/drawing/2014/main" id="{5B788402-A3DC-4CA0-AD0C-D7C651C13F3D}"/>
               </a:ext>
             </a:extLst>
           </p:cNvPr>
@@ -34295,129 +32651,84 @@
           <p:nvPr>
             <p:extLst>
               <p:ext uri="{D42A27DB-BD31-4B8C-83A1-F6EECF244321}">
-                <p14:modId xmlns:p14="http://schemas.microsoft.com/office/powerpoint/2010/main" val="3600786863"/>
+                <p14:modId xmlns:p14="http://schemas.microsoft.com/office/powerpoint/2010/main" val="1507626843"/>
               </p:ext>
             </p:extLst>
           </p:nvPr>
         </p:nvGraphicFramePr>
         <p:xfrm>
-          <a:off x="262800" y="1308600"/>
-          <a:ext cx="8686800" cy="4031329"/>
+          <a:off x="331200" y="1397001"/>
+          <a:ext cx="8618400" cy="3196666"/>
         </p:xfrm>
         <a:graphic>
           <a:graphicData uri="http://schemas.openxmlformats.org/drawingml/2006/table">
             <a:tbl>
-              <a:tblPr firstRow="1">
-                <a:tableStyleId>{5C22544A-7EE6-4342-B048-85BDC9FD1C3A}</a:tableStyleId>
+              <a:tblPr bandCol="1">
+                <a:tableStyleId>{3C2FFA5D-87B4-456A-9821-1D502468CF0F}</a:tableStyleId>
               </a:tblPr>
               <a:tblGrid>
-                <a:gridCol w="2667600">
+                <a:gridCol w="1983600">
                   <a:extLst>
                     <a:ext uri="{9D8B030D-6E8A-4147-A177-3AD203B41FA5}">
-                      <a16:colId xmlns:a16="http://schemas.microsoft.com/office/drawing/2014/main" val="335921228"/>
+                      <a16:colId xmlns:a16="http://schemas.microsoft.com/office/drawing/2014/main" val="2102384054"/>
                     </a:ext>
                   </a:extLst>
                 </a:gridCol>
-                <a:gridCol w="2736000">
+                <a:gridCol w="6634800">
                   <a:extLst>
                     <a:ext uri="{9D8B030D-6E8A-4147-A177-3AD203B41FA5}">
-                      <a16:colId xmlns:a16="http://schemas.microsoft.com/office/drawing/2014/main" val="540540298"/>
-                    </a:ext>
-                  </a:extLst>
-                </a:gridCol>
-                <a:gridCol w="3283200">
-                  <a:extLst>
-                    <a:ext uri="{9D8B030D-6E8A-4147-A177-3AD203B41FA5}">
-                      <a16:colId xmlns:a16="http://schemas.microsoft.com/office/drawing/2014/main" val="3278667484"/>
+                      <a16:colId xmlns:a16="http://schemas.microsoft.com/office/drawing/2014/main" val="2948652579"/>
                     </a:ext>
                   </a:extLst>
                 </a:gridCol>
               </a:tblGrid>
-              <a:tr h="287168">
+              <a:tr h="629279">
                 <a:tc>
                   <a:txBody>
                     <a:bodyPr/>
                     <a:lstStyle/>
                     <a:p>
-                      <a:pPr algn="just" fontAlgn="b"/>
+                      <a:pPr algn="l"/>
                       <a:r>
-                        <a:rPr lang="en-US" sz="2000" u="none" strike="noStrike" dirty="0">
+                        <a:rPr lang="en-US" sz="2000" b="1" u="none" strike="noStrike" kern="1200" dirty="0">
+                          <a:solidFill>
+                            <a:schemeClr val="lt1"/>
+                          </a:solidFill>
                           <a:effectLst/>
+                          <a:latin typeface="+mn-lt"/>
+                          <a:ea typeface="+mn-ea"/>
+                          <a:cs typeface="+mn-cs"/>
                         </a:rPr>
                         <a:t>TITLE</a:t>
                       </a:r>
-                      <a:endParaRPr lang="en-US" sz="2000" b="0" i="0" u="none" strike="noStrike" dirty="0">
-                        <a:solidFill>
-                          <a:srgbClr val="000000"/>
-                        </a:solidFill>
-                        <a:effectLst/>
-                        <a:latin typeface="Arial" panose="020B0604020202020204" pitchFamily="34" charset="0"/>
-                      </a:endParaRPr>
                     </a:p>
                   </a:txBody>
-                  <a:tcPr marL="5554" marR="5554" marT="5554" marB="0"/>
+                  <a:tcPr/>
                 </a:tc>
                 <a:tc>
                   <a:txBody>
                     <a:bodyPr/>
                     <a:lstStyle/>
                     <a:p>
-                      <a:pPr algn="just" fontAlgn="b"/>
+                      <a:pPr marL="0" marR="0" lvl="0" indent="0" algn="just" defTabSz="914400" rtl="0" eaLnBrk="1" fontAlgn="auto" latinLnBrk="0" hangingPunct="1">
+                        <a:lnSpc>
+                          <a:spcPct val="100000"/>
+                        </a:lnSpc>
+                        <a:spcBef>
+                          <a:spcPts val="0"/>
+                        </a:spcBef>
+                        <a:spcAft>
+                          <a:spcPts val="0"/>
+                        </a:spcAft>
+                        <a:buClrTx/>
+                        <a:buSzTx/>
+                        <a:buFontTx/>
+                        <a:buNone/>
+                        <a:tabLst/>
+                        <a:defRPr/>
+                      </a:pPr>
                       <a:r>
-                        <a:rPr lang="en-US" sz="2000" u="none" strike="noStrike" dirty="0">
-                          <a:effectLst/>
-                        </a:rPr>
-                        <a:t>AUTHOR</a:t>
-                      </a:r>
-                      <a:endParaRPr lang="en-US" sz="2000" b="0" i="0" u="none" strike="noStrike" dirty="0">
-                        <a:solidFill>
-                          <a:srgbClr val="000000"/>
-                        </a:solidFill>
-                        <a:effectLst/>
-                        <a:latin typeface="Arial" panose="020B0604020202020204" pitchFamily="34" charset="0"/>
-                      </a:endParaRPr>
-                    </a:p>
-                  </a:txBody>
-                  <a:tcPr marL="5554" marR="5554" marT="5554" marB="0"/>
-                </a:tc>
-                <a:tc>
-                  <a:txBody>
-                    <a:bodyPr/>
-                    <a:lstStyle/>
-                    <a:p>
-                      <a:pPr algn="just" fontAlgn="b"/>
-                      <a:r>
-                        <a:rPr lang="en-US" sz="2000" u="none" strike="noStrike" dirty="0">
-                          <a:effectLst/>
-                        </a:rPr>
-                        <a:t>AIM OF THE PAPER</a:t>
-                      </a:r>
-                      <a:endParaRPr lang="en-US" sz="2000" b="0" i="0" u="none" strike="noStrike" dirty="0">
-                        <a:solidFill>
-                          <a:srgbClr val="000000"/>
-                        </a:solidFill>
-                        <a:effectLst/>
-                        <a:latin typeface="Arial" panose="020B0604020202020204" pitchFamily="34" charset="0"/>
-                      </a:endParaRPr>
-                    </a:p>
-                  </a:txBody>
-                  <a:tcPr marL="5554" marR="5554" marT="5554" marB="0"/>
-                </a:tc>
-                <a:extLst>
-                  <a:ext uri="{0D108BD9-81ED-4DB2-BD59-A6C34878D82A}">
-                    <a16:rowId xmlns:a16="http://schemas.microsoft.com/office/drawing/2014/main" val="2254447333"/>
-                  </a:ext>
-                </a:extLst>
-              </a:tr>
-              <a:tr h="1741646">
-                <a:tc>
-                  <a:txBody>
-                    <a:bodyPr/>
-                    <a:lstStyle/>
-                    <a:p>
-                      <a:pPr algn="just" fontAlgn="b"/>
-                      <a:r>
-                        <a:rPr lang="en-US" sz="1400" b="0" i="0" u="none" strike="noStrike" kern="1200" dirty="0">
+                        <a:rPr lang="en-US" sz="1600" b="0" i="0" u="none" strike="noStrike" kern="1200" dirty="0">
                           <a:solidFill>
                             <a:srgbClr val="000000"/>
                           </a:solidFill>
@@ -34430,16 +32741,61 @@
                       </a:r>
                     </a:p>
                   </a:txBody>
-                  <a:tcPr marL="7620" marR="7620" marT="7620" marB="0"/>
+                  <a:tcPr/>
+                </a:tc>
+                <a:extLst>
+                  <a:ext uri="{0D108BD9-81ED-4DB2-BD59-A6C34878D82A}">
+                    <a16:rowId xmlns:a16="http://schemas.microsoft.com/office/drawing/2014/main" val="1564620126"/>
+                  </a:ext>
+                </a:extLst>
+              </a:tr>
+              <a:tr h="1064933">
+                <a:tc>
+                  <a:txBody>
+                    <a:bodyPr/>
+                    <a:lstStyle/>
+                    <a:p>
+                      <a:pPr algn="l"/>
+                      <a:r>
+                        <a:rPr lang="en-US" sz="2000" b="1" u="none" strike="noStrike" kern="1200" dirty="0">
+                          <a:solidFill>
+                            <a:schemeClr val="lt1"/>
+                          </a:solidFill>
+                          <a:effectLst/>
+                          <a:latin typeface="+mn-lt"/>
+                          <a:ea typeface="+mn-ea"/>
+                          <a:cs typeface="+mn-cs"/>
+                        </a:rPr>
+                        <a:t>AUTHOR</a:t>
+                      </a:r>
+                    </a:p>
+                  </a:txBody>
+                  <a:tcPr/>
                 </a:tc>
                 <a:tc>
                   <a:txBody>
                     <a:bodyPr/>
                     <a:lstStyle/>
                     <a:p>
-                      <a:pPr algn="just" fontAlgn="b"/>
+                      <a:pPr marL="0" marR="0" lvl="0" indent="0" algn="just" defTabSz="914400" rtl="0" eaLnBrk="1" fontAlgn="auto" latinLnBrk="0" hangingPunct="1">
+                        <a:lnSpc>
+                          <a:spcPct val="100000"/>
+                        </a:lnSpc>
+                        <a:spcBef>
+                          <a:spcPts val="0"/>
+                        </a:spcBef>
+                        <a:spcAft>
+                          <a:spcPts val="0"/>
+                        </a:spcAft>
+                        <a:buClrTx/>
+                        <a:buSzTx/>
+                        <a:buFontTx/>
+                        <a:buNone/>
+                        <a:tabLst/>
+                        <a:defRPr/>
+                      </a:pPr>
                       <a:r>
-                        <a:rPr lang="en-US" sz="1400" b="0" i="0" u="none" strike="noStrike" kern="1200" dirty="0">
+                        <a:rPr lang="en-US" sz="1600" b="0" i="0" u="none" strike="noStrike" kern="1200" dirty="0">
                           <a:solidFill>
                             <a:srgbClr val="000000"/>
                           </a:solidFill>
@@ -34451,7 +32807,7 @@
                         <a:t>Y. Hui, "Intelligent Management System of Sunshine Sports Activities for College Students," 2019 International Conference on Smart Grid and Electrical Automation (ICSGEA), 2019, pp. 505-509, </a:t>
                       </a:r>
                       <a:r>
-                        <a:rPr lang="en-US" sz="1400" b="0" i="0" u="none" strike="noStrike" kern="1200" dirty="0" err="1">
+                        <a:rPr lang="en-US" sz="1600" b="0" i="0" u="none" strike="noStrike" kern="1200" dirty="0" err="1">
                           <a:solidFill>
                             <a:srgbClr val="000000"/>
                           </a:solidFill>
@@ -34463,7 +32819,7 @@
                         <a:t>doi</a:t>
                       </a:r>
                       <a:r>
-                        <a:rPr lang="en-US" sz="1400" b="0" i="0" u="none" strike="noStrike" kern="1200" dirty="0">
+                        <a:rPr lang="en-US" sz="1600" b="0" i="0" u="none" strike="noStrike" kern="1200" dirty="0">
                           <a:solidFill>
                             <a:srgbClr val="000000"/>
                           </a:solidFill>
@@ -34476,16 +32832,77 @@
                       </a:r>
                     </a:p>
                   </a:txBody>
-                  <a:tcPr marL="7620" marR="7620" marT="7620" marB="0"/>
+                  <a:tcPr/>
+                </a:tc>
+                <a:extLst>
+                  <a:ext uri="{0D108BD9-81ED-4DB2-BD59-A6C34878D82A}">
+                    <a16:rowId xmlns:a16="http://schemas.microsoft.com/office/drawing/2014/main" val="1417993570"/>
+                  </a:ext>
+                </a:extLst>
+              </a:tr>
+              <a:tr h="1500587">
+                <a:tc>
+                  <a:txBody>
+                    <a:bodyPr/>
+                    <a:lstStyle/>
+                    <a:p>
+                      <a:pPr marL="0" marR="0" lvl="0" indent="0" algn="l" defTabSz="914400" rtl="0" eaLnBrk="1" fontAlgn="auto" latinLnBrk="0" hangingPunct="1">
+                        <a:lnSpc>
+                          <a:spcPct val="100000"/>
+                        </a:lnSpc>
+                        <a:spcBef>
+                          <a:spcPts val="0"/>
+                        </a:spcBef>
+                        <a:spcAft>
+                          <a:spcPts val="0"/>
+                        </a:spcAft>
+                        <a:buClrTx/>
+                        <a:buSzTx/>
+                        <a:buFontTx/>
+                        <a:buNone/>
+                        <a:tabLst/>
+                        <a:defRPr/>
+                      </a:pPr>
+                      <a:r>
+                        <a:rPr lang="en-US" sz="2000" b="1" u="none" strike="noStrike" kern="1200" dirty="0">
+                          <a:solidFill>
+                            <a:schemeClr val="lt1"/>
+                          </a:solidFill>
+                          <a:effectLst/>
+                          <a:latin typeface="+mn-lt"/>
+                          <a:ea typeface="+mn-ea"/>
+                          <a:cs typeface="+mn-cs"/>
+                        </a:rPr>
+                        <a:t>AIM OF THE PAPER</a:t>
+                      </a:r>
+                    </a:p>
+                  </a:txBody>
+                  <a:tcPr/>
                 </a:tc>
                 <a:tc>
                   <a:txBody>
                     <a:bodyPr/>
                     <a:lstStyle/>
                     <a:p>
-                      <a:pPr algn="just" fontAlgn="b"/>
+                      <a:pPr marL="0" marR="0" lvl="0" indent="0" algn="just" defTabSz="914400" rtl="0" eaLnBrk="1" fontAlgn="auto" latinLnBrk="0" hangingPunct="1">
+                        <a:lnSpc>
+                          <a:spcPct val="100000"/>
+                        </a:lnSpc>
+                        <a:spcBef>
+                          <a:spcPts val="0"/>
+                        </a:spcBef>
+                        <a:spcAft>
+                          <a:spcPts val="0"/>
+                        </a:spcAft>
+                        <a:buClrTx/>
+                        <a:buSzTx/>
+                        <a:buFontTx/>
+                        <a:buNone/>
+                        <a:tabLst/>
+                        <a:defRPr/>
+                      </a:pPr>
                       <a:r>
-                        <a:rPr lang="en-US" sz="1400" b="0" i="0" u="none" strike="noStrike" kern="1200" dirty="0">
+                        <a:rPr lang="en-US" sz="1600" b="0" i="0" u="none" strike="noStrike" kern="1200" dirty="0">
                           <a:solidFill>
                             <a:srgbClr val="000000"/>
                           </a:solidFill>
@@ -34498,23 +32915,200 @@
                       </a:r>
                     </a:p>
                   </a:txBody>
-                  <a:tcPr marL="7620" marR="7620" marT="7620" marB="0"/>
+                  <a:tcPr/>
                 </a:tc>
                 <a:extLst>
                   <a:ext uri="{0D108BD9-81ED-4DB2-BD59-A6C34878D82A}">
-                    <a16:rowId xmlns:a16="http://schemas.microsoft.com/office/drawing/2014/main" val="874216702"/>
+                    <a16:rowId xmlns:a16="http://schemas.microsoft.com/office/drawing/2014/main" val="3451796426"/>
                   </a:ext>
                 </a:extLst>
               </a:tr>
-              <a:tr h="1979329">
+            </a:tbl>
+          </a:graphicData>
+        </a:graphic>
+      </p:graphicFrame>
+    </p:spTree>
+    <p:extLst>
+      <p:ext uri="{BB962C8B-B14F-4D97-AF65-F5344CB8AC3E}">
+        <p14:creationId xmlns:p14="http://schemas.microsoft.com/office/powerpoint/2010/main" val="2486402360"/>
+      </p:ext>
+    </p:extLst>
+  </p:cSld>
+  <p:clrMapOvr>
+    <a:masterClrMapping/>
+  </p:clrMapOvr>
+</p:sld>
+</file>
+
+<file path=ppt/slides/slide9.xml><?xml version="1.0" encoding="utf-8"?>
+<p:sld xmlns:a="http://schemas.openxmlformats.org/drawingml/2006/main" xmlns:r="http://schemas.openxmlformats.org/officeDocument/2006/relationships" xmlns:p="http://schemas.openxmlformats.org/presentationml/2006/main">
+  <p:cSld>
+    <p:spTree>
+      <p:nvGrpSpPr>
+        <p:cNvPr id="1" name=""/>
+        <p:cNvGrpSpPr/>
+        <p:nvPr/>
+      </p:nvGrpSpPr>
+      <p:grpSpPr>
+        <a:xfrm>
+          <a:off x="0" y="0"/>
+          <a:ext cx="0" cy="0"/>
+          <a:chOff x="0" y="0"/>
+          <a:chExt cx="0" cy="0"/>
+        </a:xfrm>
+      </p:grpSpPr>
+      <p:sp>
+        <p:nvSpPr>
+          <p:cNvPr id="22531" name="Title 4">
+            <a:extLst>
+              <a:ext uri="{FF2B5EF4-FFF2-40B4-BE49-F238E27FC236}">
+                <a16:creationId xmlns:a16="http://schemas.microsoft.com/office/drawing/2014/main" id="{B68DEF6B-993C-4BCC-A395-CCA095C5ED34}"/>
+              </a:ext>
+            </a:extLst>
+          </p:cNvPr>
+          <p:cNvSpPr>
+            <a:spLocks noGrp="1"/>
+          </p:cNvSpPr>
+          <p:nvPr>
+            <p:ph type="ctrTitle"/>
+          </p:nvPr>
+        </p:nvSpPr>
+        <p:spPr bwMode="auto">
+          <a:xfrm>
+            <a:off x="1152000" y="145800"/>
+            <a:ext cx="7797600" cy="1025999"/>
+          </a:xfrm>
+          <a:noFill/>
+          <a:extLst>
+            <a:ext uri="{909E8E84-426E-40DD-AFC4-6F175D3DCCD1}">
+              <a14:hiddenFill xmlns:a14="http://schemas.microsoft.com/office/drawing/2010/main">
+                <a:solidFill>
+                  <a:srgbClr val="FFFFFF"/>
+                </a:solidFill>
+              </a14:hiddenFill>
+            </a:ext>
+            <a:ext uri="{91240B29-F687-4F45-9708-019B960494DF}">
+              <a14:hiddenLine xmlns:a14="http://schemas.microsoft.com/office/drawing/2010/main" w="9525">
+                <a:solidFill>
+                  <a:srgbClr val="000000"/>
+                </a:solidFill>
+                <a:miter lim="800000"/>
+                <a:headEnd/>
+                <a:tailEnd/>
+              </a14:hiddenLine>
+            </a:ext>
+          </a:extLst>
+        </p:spPr>
+        <p:txBody>
+          <a:bodyPr vert="horz" wrap="square" lIns="91440" tIns="45720" rIns="91440" bIns="45720" numCol="1" anchor="ctr" anchorCtr="0" compatLnSpc="1">
+            <a:prstTxWarp prst="textNoShape">
+              <a:avLst/>
+            </a:prstTxWarp>
+          </a:bodyPr>
+          <a:lstStyle/>
+          <a:p>
+            <a:r>
+              <a:rPr lang="en-IN" altLang="en-US" sz="3600" b="1" dirty="0">
+                <a:latin typeface="Arial" panose="020B0604020202020204" pitchFamily="34" charset="0"/>
+                <a:cs typeface="Arial" panose="020B0604020202020204" pitchFamily="34" charset="0"/>
+              </a:rPr>
+              <a:t>Literature survey</a:t>
+            </a:r>
+          </a:p>
+        </p:txBody>
+      </p:sp>
+      <p:graphicFrame>
+        <p:nvGraphicFramePr>
+          <p:cNvPr id="3" name="Table 3">
+            <a:extLst>
+              <a:ext uri="{FF2B5EF4-FFF2-40B4-BE49-F238E27FC236}">
+                <a16:creationId xmlns:a16="http://schemas.microsoft.com/office/drawing/2014/main" id="{5B788402-A3DC-4CA0-AD0C-D7C651C13F3D}"/>
+              </a:ext>
+            </a:extLst>
+          </p:cNvPr>
+          <p:cNvGraphicFramePr>
+            <a:graphicFrameLocks noGrp="1"/>
+          </p:cNvGraphicFramePr>
+          <p:nvPr>
+            <p:extLst>
+              <p:ext uri="{D42A27DB-BD31-4B8C-83A1-F6EECF244321}">
+                <p14:modId xmlns:p14="http://schemas.microsoft.com/office/powerpoint/2010/main" val="2664778008"/>
+              </p:ext>
+            </p:extLst>
+          </p:nvPr>
+        </p:nvGraphicFramePr>
+        <p:xfrm>
+          <a:off x="331200" y="1397001"/>
+          <a:ext cx="8618400" cy="3196666"/>
+        </p:xfrm>
+        <a:graphic>
+          <a:graphicData uri="http://schemas.openxmlformats.org/drawingml/2006/table">
+            <a:tbl>
+              <a:tblPr bandCol="1">
+                <a:tableStyleId>{3C2FFA5D-87B4-456A-9821-1D502468CF0F}</a:tableStyleId>
+              </a:tblPr>
+              <a:tblGrid>
+                <a:gridCol w="1983600">
+                  <a:extLst>
+                    <a:ext uri="{9D8B030D-6E8A-4147-A177-3AD203B41FA5}">
+                      <a16:colId xmlns:a16="http://schemas.microsoft.com/office/drawing/2014/main" val="2102384054"/>
+                    </a:ext>
+                  </a:extLst>
+                </a:gridCol>
+                <a:gridCol w="6634800">
+                  <a:extLst>
+                    <a:ext uri="{9D8B030D-6E8A-4147-A177-3AD203B41FA5}">
+                      <a16:colId xmlns:a16="http://schemas.microsoft.com/office/drawing/2014/main" val="2948652579"/>
+                    </a:ext>
+                  </a:extLst>
+                </a:gridCol>
+              </a:tblGrid>
+              <a:tr h="629279">
                 <a:tc>
                   <a:txBody>
                     <a:bodyPr/>
                     <a:lstStyle/>
                     <a:p>
-                      <a:pPr algn="just" fontAlgn="b"/>
                       <a:r>
-                        <a:rPr lang="en-US" sz="1400" b="0" i="0" u="none" strike="noStrike" kern="1200" dirty="0">
+                        <a:rPr lang="en-US" sz="2000" b="1" u="none" strike="noStrike" kern="1200" dirty="0">
+                          <a:solidFill>
+                            <a:schemeClr val="lt1"/>
+                          </a:solidFill>
+                          <a:effectLst/>
+                          <a:latin typeface="+mn-lt"/>
+                          <a:ea typeface="+mn-ea"/>
+                          <a:cs typeface="+mn-cs"/>
+                        </a:rPr>
+                        <a:t>TITLE</a:t>
+                      </a:r>
+                    </a:p>
+                  </a:txBody>
+                  <a:tcPr/>
+                </a:tc>
+                <a:tc>
+                  <a:txBody>
+                    <a:bodyPr/>
+                    <a:lstStyle/>
+                    <a:p>
+                      <a:pPr marL="0" marR="0" lvl="0" indent="0" algn="just" defTabSz="914400" rtl="0" eaLnBrk="1" fontAlgn="auto" latinLnBrk="0" hangingPunct="1">
+                        <a:lnSpc>
+                          <a:spcPct val="100000"/>
+                        </a:lnSpc>
+                        <a:spcBef>
+                          <a:spcPts val="0"/>
+                        </a:spcBef>
+                        <a:spcAft>
+                          <a:spcPts val="0"/>
+                        </a:spcAft>
+                        <a:buClrTx/>
+                        <a:buSzTx/>
+                        <a:buFontTx/>
+                        <a:buNone/>
+                        <a:tabLst/>
+                        <a:defRPr/>
+                      </a:pPr>
+                      <a:r>
+                        <a:rPr lang="en-US" sz="1600" b="0" i="0" u="none" strike="noStrike" kern="1200" dirty="0">
                           <a:solidFill>
                             <a:srgbClr val="000000"/>
                           </a:solidFill>
@@ -34527,16 +33121,60 @@
                       </a:r>
                     </a:p>
                   </a:txBody>
-                  <a:tcPr marL="5541" marR="5541" marT="5541" marB="0"/>
+                  <a:tcPr/>
+                </a:tc>
+                <a:extLst>
+                  <a:ext uri="{0D108BD9-81ED-4DB2-BD59-A6C34878D82A}">
+                    <a16:rowId xmlns:a16="http://schemas.microsoft.com/office/drawing/2014/main" val="1564620126"/>
+                  </a:ext>
+                </a:extLst>
+              </a:tr>
+              <a:tr h="1064933">
+                <a:tc>
+                  <a:txBody>
+                    <a:bodyPr/>
+                    <a:lstStyle/>
+                    <a:p>
+                      <a:r>
+                        <a:rPr lang="en-US" sz="2000" b="1" u="none" strike="noStrike" kern="1200" dirty="0">
+                          <a:solidFill>
+                            <a:schemeClr val="lt1"/>
+                          </a:solidFill>
+                          <a:effectLst/>
+                          <a:latin typeface="+mn-lt"/>
+                          <a:ea typeface="+mn-ea"/>
+                          <a:cs typeface="+mn-cs"/>
+                        </a:rPr>
+                        <a:t>AUTHOR</a:t>
+                      </a:r>
+                    </a:p>
+                  </a:txBody>
+                  <a:tcPr/>
                 </a:tc>
                 <a:tc>
                   <a:txBody>
                     <a:bodyPr/>
                     <a:lstStyle/>
                     <a:p>
-                      <a:pPr algn="just" fontAlgn="b"/>
+                      <a:pPr marL="0" marR="0" lvl="0" indent="0" algn="just" defTabSz="914400" rtl="0" eaLnBrk="1" fontAlgn="auto" latinLnBrk="0" hangingPunct="1">
+                        <a:lnSpc>
+                          <a:spcPct val="100000"/>
+                        </a:lnSpc>
+                        <a:spcBef>
+                          <a:spcPts val="0"/>
+                        </a:spcBef>
+                        <a:spcAft>
+                          <a:spcPts val="0"/>
+                        </a:spcAft>
+                        <a:buClrTx/>
+                        <a:buSzTx/>
+                        <a:buFontTx/>
+                        <a:buNone/>
+                        <a:tabLst/>
+                        <a:defRPr/>
+                      </a:pPr>
                       <a:r>
-                        <a:rPr lang="en-US" sz="1400" b="0" i="0" u="none" strike="noStrike" kern="1200" dirty="0">
+                        <a:rPr lang="en-US" sz="1600" b="0" i="0" u="none" strike="noStrike" kern="1200" dirty="0">
                           <a:solidFill>
                             <a:srgbClr val="000000"/>
                           </a:solidFill>
@@ -34548,7 +33186,7 @@
                         <a:t>L. Li, W. Chou, W. Zhou and M. Luo, "Design Patterns and Extensibility of REST API for Networking Applications," in IEEE Transactions on Network and Service Management, vol. 13, no. 1, pp. 154-167, March 2016, </a:t>
                       </a:r>
                       <a:r>
-                        <a:rPr lang="en-US" sz="1400" b="0" i="0" u="none" strike="noStrike" kern="1200" dirty="0" err="1">
+                        <a:rPr lang="en-US" sz="1600" b="0" i="0" u="none" strike="noStrike" kern="1200" dirty="0" err="1">
                           <a:solidFill>
                             <a:srgbClr val="000000"/>
                           </a:solidFill>
@@ -34560,7 +33198,7 @@
                         <a:t>doi</a:t>
                       </a:r>
                       <a:r>
-                        <a:rPr lang="en-US" sz="1400" b="0" i="0" u="none" strike="noStrike" kern="1200" dirty="0">
+                        <a:rPr lang="en-US" sz="1600" b="0" i="0" u="none" strike="noStrike" kern="1200" dirty="0">
                           <a:solidFill>
                             <a:srgbClr val="000000"/>
                           </a:solidFill>
@@ -34573,16 +33211,77 @@
                       </a:r>
                     </a:p>
                   </a:txBody>
-                  <a:tcPr marL="5541" marR="5541" marT="5541" marB="0"/>
+                  <a:tcPr/>
+                </a:tc>
+                <a:extLst>
+                  <a:ext uri="{0D108BD9-81ED-4DB2-BD59-A6C34878D82A}">
+                    <a16:rowId xmlns:a16="http://schemas.microsoft.com/office/drawing/2014/main" val="1417993570"/>
+                  </a:ext>
+                </a:extLst>
+              </a:tr>
+              <a:tr h="1500587">
+                <a:tc>
+                  <a:txBody>
+                    <a:bodyPr/>
+                    <a:lstStyle/>
+                    <a:p>
+                      <a:pPr marL="0" marR="0" lvl="0" indent="0" algn="l" defTabSz="914400" rtl="0" eaLnBrk="1" fontAlgn="auto" latinLnBrk="0" hangingPunct="1">
+                        <a:lnSpc>
+                          <a:spcPct val="100000"/>
+                        </a:lnSpc>
+                        <a:spcBef>
+                          <a:spcPts val="0"/>
+                        </a:spcBef>
+                        <a:spcAft>
+                          <a:spcPts val="0"/>
+                        </a:spcAft>
+                        <a:buClrTx/>
+                        <a:buSzTx/>
+                        <a:buFontTx/>
+                        <a:buNone/>
+                        <a:tabLst/>
+                        <a:defRPr/>
+                      </a:pPr>
+                      <a:r>
+                        <a:rPr lang="en-US" sz="2000" b="1" u="none" strike="noStrike" kern="1200" dirty="0">
+                          <a:solidFill>
+                            <a:schemeClr val="lt1"/>
+                          </a:solidFill>
+                          <a:effectLst/>
+                          <a:latin typeface="+mn-lt"/>
+                          <a:ea typeface="+mn-ea"/>
+                          <a:cs typeface="+mn-cs"/>
+                        </a:rPr>
+                        <a:t>AIM OF THE PAPER</a:t>
+                      </a:r>
+                    </a:p>
+                  </a:txBody>
+                  <a:tcPr/>
                 </a:tc>
                 <a:tc>
                   <a:txBody>
                     <a:bodyPr/>
                     <a:lstStyle/>
                     <a:p>
-                      <a:pPr algn="just" fontAlgn="b"/>
+                      <a:pPr marL="0" marR="0" lvl="0" indent="0" algn="just" defTabSz="914400" rtl="0" eaLnBrk="1" fontAlgn="auto" latinLnBrk="0" hangingPunct="1">
+                        <a:lnSpc>
+                          <a:spcPct val="100000"/>
+                        </a:lnSpc>
+                        <a:spcBef>
+                          <a:spcPts val="0"/>
+                        </a:spcBef>
+                        <a:spcAft>
+                          <a:spcPts val="0"/>
+                        </a:spcAft>
+                        <a:buClrTx/>
+                        <a:buSzTx/>
+                        <a:buFontTx/>
+                        <a:buNone/>
+                        <a:tabLst/>
+                        <a:defRPr/>
+                      </a:pPr>
                       <a:r>
-                        <a:rPr lang="en-US" sz="1400" b="0" i="0" u="none" strike="noStrike" kern="1200" dirty="0">
+                        <a:rPr lang="en-US" sz="1600" b="0" i="0" u="none" strike="noStrike" kern="1200" dirty="0">
                           <a:solidFill>
                             <a:srgbClr val="000000"/>
                           </a:solidFill>
@@ -34595,11 +33294,11 @@
                       </a:r>
                     </a:p>
                   </a:txBody>
-                  <a:tcPr marL="5541" marR="5541" marT="5541" marB="0"/>
+                  <a:tcPr/>
                 </a:tc>
                 <a:extLst>
                   <a:ext uri="{0D108BD9-81ED-4DB2-BD59-A6C34878D82A}">
-                    <a16:rowId xmlns:a16="http://schemas.microsoft.com/office/drawing/2014/main" val="3840934179"/>
+                    <a16:rowId xmlns:a16="http://schemas.microsoft.com/office/drawing/2014/main" val="3451796426"/>
                   </a:ext>
                 </a:extLst>
               </a:tr>
@@ -34610,7 +33309,7 @@
     </p:spTree>
     <p:extLst>
       <p:ext uri="{BB962C8B-B14F-4D97-AF65-F5344CB8AC3E}">
-        <p14:creationId xmlns:p14="http://schemas.microsoft.com/office/powerpoint/2010/main" val="67601317"/>
+        <p14:creationId xmlns:p14="http://schemas.microsoft.com/office/powerpoint/2010/main" val="1922605544"/>
       </p:ext>
     </p:extLst>
   </p:cSld>

</xml_diff>